<commit_message>
At 9:30 Aug 18
</commit_message>
<xml_diff>
--- a/LACity Crime-Dora.pptx
+++ b/LACity Crime-Dora.pptx
@@ -2,33 +2,32 @@
 <file path=ppt/presentation.xml><?xml version="1.0" encoding="utf-8"?>
 <p:presentation xmlns:a="http://schemas.openxmlformats.org/drawingml/2006/main" xmlns:r="http://schemas.openxmlformats.org/officeDocument/2006/relationships" xmlns:p="http://schemas.openxmlformats.org/presentationml/2006/main" saveSubsetFonts="1" autoCompressPictures="0">
   <p:sldMasterIdLst>
-    <p:sldMasterId id="2147483660" r:id="rId1"/>
+    <p:sldMasterId id="2147483684" r:id="rId1"/>
   </p:sldMasterIdLst>
   <p:sldIdLst>
     <p:sldId id="257" r:id="rId2"/>
     <p:sldId id="258" r:id="rId3"/>
-    <p:sldId id="259" r:id="rId4"/>
-    <p:sldId id="260" r:id="rId5"/>
+    <p:sldId id="260" r:id="rId4"/>
+    <p:sldId id="283" r:id="rId5"/>
     <p:sldId id="274" r:id="rId6"/>
     <p:sldId id="261" r:id="rId7"/>
-    <p:sldId id="275" r:id="rId8"/>
+    <p:sldId id="285" r:id="rId8"/>
     <p:sldId id="276" r:id="rId9"/>
-    <p:sldId id="277" r:id="rId10"/>
+    <p:sldId id="286" r:id="rId10"/>
     <p:sldId id="271" r:id="rId11"/>
     <p:sldId id="272" r:id="rId12"/>
     <p:sldId id="273" r:id="rId13"/>
     <p:sldId id="269" r:id="rId14"/>
     <p:sldId id="268" r:id="rId15"/>
     <p:sldId id="282" r:id="rId16"/>
-    <p:sldId id="278" r:id="rId17"/>
+    <p:sldId id="287" r:id="rId17"/>
     <p:sldId id="267" r:id="rId18"/>
     <p:sldId id="263" r:id="rId19"/>
     <p:sldId id="264" r:id="rId20"/>
     <p:sldId id="265" r:id="rId21"/>
-    <p:sldId id="279" r:id="rId22"/>
-    <p:sldId id="266" r:id="rId23"/>
-    <p:sldId id="280" r:id="rId24"/>
-    <p:sldId id="270" r:id="rId25"/>
+    <p:sldId id="266" r:id="rId22"/>
+    <p:sldId id="284" r:id="rId23"/>
+    <p:sldId id="270" r:id="rId24"/>
   </p:sldIdLst>
   <p:sldSz cx="12192000" cy="6858000"/>
   <p:notesSz cx="6858000" cy="9144000"/>
@@ -170,7 +169,7 @@
             <p:ph type="ctrTitle"/>
           </p:nvPr>
         </p:nvSpPr>
-        <p:spPr bwMode="blackWhite">
+        <p:spPr>
           <a:xfrm>
             <a:off x="1600200" y="2386744"/>
             <a:ext cx="8991600" cy="1645920"/>
@@ -349,7 +348,7 @@
     </p:spTree>
     <p:extLst>
       <p:ext uri="{BB962C8B-B14F-4D97-AF65-F5344CB8AC3E}">
-        <p14:creationId xmlns:p14="http://schemas.microsoft.com/office/powerpoint/2010/main" val="562824399"/>
+        <p14:creationId xmlns:p14="http://schemas.microsoft.com/office/powerpoint/2010/main" val="3408894523"/>
       </p:ext>
     </p:extLst>
   </p:cSld>
@@ -519,7 +518,7 @@
     </p:spTree>
     <p:extLst>
       <p:ext uri="{BB962C8B-B14F-4D97-AF65-F5344CB8AC3E}">
-        <p14:creationId xmlns:p14="http://schemas.microsoft.com/office/powerpoint/2010/main" val="2272177211"/>
+        <p14:creationId xmlns:p14="http://schemas.microsoft.com/office/powerpoint/2010/main" val="1175882164"/>
       </p:ext>
     </p:extLst>
   </p:cSld>
@@ -699,7 +698,7 @@
     </p:spTree>
     <p:extLst>
       <p:ext uri="{BB962C8B-B14F-4D97-AF65-F5344CB8AC3E}">
-        <p14:creationId xmlns:p14="http://schemas.microsoft.com/office/powerpoint/2010/main" val="1573935321"/>
+        <p14:creationId xmlns:p14="http://schemas.microsoft.com/office/powerpoint/2010/main" val="4098060957"/>
       </p:ext>
     </p:extLst>
   </p:cSld>
@@ -869,7 +868,7 @@
     </p:spTree>
     <p:extLst>
       <p:ext uri="{BB962C8B-B14F-4D97-AF65-F5344CB8AC3E}">
-        <p14:creationId xmlns:p14="http://schemas.microsoft.com/office/powerpoint/2010/main" val="95583033"/>
+        <p14:creationId xmlns:p14="http://schemas.microsoft.com/office/powerpoint/2010/main" val="1541188808"/>
       </p:ext>
     </p:extLst>
   </p:cSld>
@@ -914,7 +913,7 @@
             <p:ph type="title"/>
           </p:nvPr>
         </p:nvSpPr>
-        <p:spPr bwMode="blackWhite">
+        <p:spPr>
           <a:xfrm>
             <a:off x="1600200" y="2386744"/>
             <a:ext cx="8991600" cy="1645920"/>
@@ -1137,7 +1136,7 @@
     </p:spTree>
     <p:extLst>
       <p:ext uri="{BB962C8B-B14F-4D97-AF65-F5344CB8AC3E}">
-        <p14:creationId xmlns:p14="http://schemas.microsoft.com/office/powerpoint/2010/main" val="1445543453"/>
+        <p14:creationId xmlns:p14="http://schemas.microsoft.com/office/powerpoint/2010/main" val="1911357397"/>
       </p:ext>
     </p:extLst>
   </p:cSld>
@@ -1369,7 +1368,7 @@
     </p:spTree>
     <p:extLst>
       <p:ext uri="{BB962C8B-B14F-4D97-AF65-F5344CB8AC3E}">
-        <p14:creationId xmlns:p14="http://schemas.microsoft.com/office/powerpoint/2010/main" val="1469743446"/>
+        <p14:creationId xmlns:p14="http://schemas.microsoft.com/office/powerpoint/2010/main" val="1868463181"/>
       </p:ext>
     </p:extLst>
   </p:cSld>
@@ -1421,9 +1420,7 @@
               <a:buNone/>
               <a:defRPr sz="1900" b="0" cap="all" spc="100" baseline="0">
                 <a:solidFill>
-                  <a:schemeClr val="accent2">
-                    <a:lumMod val="75000"/>
-                  </a:schemeClr>
+                  <a:schemeClr val="accent2"/>
                 </a:solidFill>
               </a:defRPr>
             </a:lvl1pPr>
@@ -1612,9 +1609,7 @@
               <a:buNone/>
               <a:defRPr sz="1900" b="0" cap="all" spc="100" baseline="0">
                 <a:solidFill>
-                  <a:schemeClr val="accent2">
-                    <a:lumMod val="75000"/>
-                  </a:schemeClr>
+                  <a:schemeClr val="accent2"/>
                 </a:solidFill>
               </a:defRPr>
             </a:lvl1pPr>
@@ -1751,7 +1746,7 @@
     </p:spTree>
     <p:extLst>
       <p:ext uri="{BB962C8B-B14F-4D97-AF65-F5344CB8AC3E}">
-        <p14:creationId xmlns:p14="http://schemas.microsoft.com/office/powerpoint/2010/main" val="56414367"/>
+        <p14:creationId xmlns:p14="http://schemas.microsoft.com/office/powerpoint/2010/main" val="2805134951"/>
       </p:ext>
     </p:extLst>
   </p:cSld>
@@ -1869,7 +1864,7 @@
     </p:spTree>
     <p:extLst>
       <p:ext uri="{BB962C8B-B14F-4D97-AF65-F5344CB8AC3E}">
-        <p14:creationId xmlns:p14="http://schemas.microsoft.com/office/powerpoint/2010/main" val="573776685"/>
+        <p14:creationId xmlns:p14="http://schemas.microsoft.com/office/powerpoint/2010/main" val="1102510534"/>
       </p:ext>
     </p:extLst>
   </p:cSld>
@@ -1964,7 +1959,7 @@
     </p:spTree>
     <p:extLst>
       <p:ext uri="{BB962C8B-B14F-4D97-AF65-F5344CB8AC3E}">
-        <p14:creationId xmlns:p14="http://schemas.microsoft.com/office/powerpoint/2010/main" val="3720705306"/>
+        <p14:creationId xmlns:p14="http://schemas.microsoft.com/office/powerpoint/2010/main" val="1973420652"/>
       </p:ext>
     </p:extLst>
   </p:cSld>
@@ -2039,7 +2034,7 @@
             <p:ph type="title"/>
           </p:nvPr>
         </p:nvSpPr>
-        <p:spPr bwMode="blackWhite">
+        <p:spPr>
           <a:xfrm>
             <a:off x="804672" y="2243828"/>
             <a:ext cx="4486656" cy="1141497"/>
@@ -2255,7 +2250,7 @@
       </p:sp>
       <p:sp>
         <p:nvSpPr>
-          <p:cNvPr id="9" name="Date Placeholder 8"/>
+          <p:cNvPr id="5" name="Date Placeholder 4"/>
           <p:cNvSpPr>
             <a:spLocks noGrp="1"/>
           </p:cNvSpPr>
@@ -2278,7 +2273,7 @@
       </p:sp>
       <p:sp>
         <p:nvSpPr>
-          <p:cNvPr id="10" name="Footer Placeholder 9"/>
+          <p:cNvPr id="6" name="Footer Placeholder 5"/>
           <p:cNvSpPr>
             <a:spLocks noGrp="1"/>
           </p:cNvSpPr>
@@ -2289,7 +2284,7 @@
         <p:spPr>
           <a:xfrm>
             <a:off x="804672" y="6236208"/>
-            <a:ext cx="5124797" cy="320040"/>
+            <a:ext cx="5167503" cy="320040"/>
           </a:xfrm>
         </p:spPr>
         <p:txBody>
@@ -2299,7 +2294,7 @@
               <a:defRPr>
                 <a:solidFill>
                   <a:srgbClr val="FFFFFF">
-                    <a:alpha val="70000"/>
+                    <a:alpha val="69804"/>
                   </a:srgbClr>
                 </a:solidFill>
               </a:defRPr>
@@ -2312,7 +2307,7 @@
       </p:sp>
       <p:sp>
         <p:nvSpPr>
-          <p:cNvPr id="11" name="Slide Number Placeholder 10"/>
+          <p:cNvPr id="7" name="Slide Number Placeholder 6"/>
           <p:cNvSpPr>
             <a:spLocks noGrp="1"/>
           </p:cNvSpPr>
@@ -2336,7 +2331,7 @@
     </p:spTree>
     <p:extLst>
       <p:ext uri="{BB962C8B-B14F-4D97-AF65-F5344CB8AC3E}">
-        <p14:creationId xmlns:p14="http://schemas.microsoft.com/office/powerpoint/2010/main" val="713959300"/>
+        <p14:creationId xmlns:p14="http://schemas.microsoft.com/office/powerpoint/2010/main" val="1973846936"/>
       </p:ext>
     </p:extLst>
   </p:cSld>
@@ -2411,7 +2406,7 @@
             <p:ph type="title"/>
           </p:nvPr>
         </p:nvSpPr>
-        <p:spPr bwMode="blackWhite">
+        <p:spPr>
           <a:xfrm>
             <a:off x="808523" y="2243828"/>
             <a:ext cx="4494998" cy="1134640"/>
@@ -2475,10 +2470,7 @@
               <a:buNone/>
               <a:defRPr sz="3200">
                 <a:solidFill>
-                  <a:schemeClr val="bg1">
-                    <a:lumMod val="85000"/>
-                    <a:lumOff val="15000"/>
-                  </a:schemeClr>
+                  <a:schemeClr val="tx1"/>
                 </a:solidFill>
               </a:defRPr>
             </a:lvl1pPr>
@@ -2597,7 +2589,7 @@
       </p:sp>
       <p:sp>
         <p:nvSpPr>
-          <p:cNvPr id="8" name="Date Placeholder 7"/>
+          <p:cNvPr id="5" name="Date Placeholder 4"/>
           <p:cNvSpPr>
             <a:spLocks noGrp="1"/>
           </p:cNvSpPr>
@@ -2612,7 +2604,9 @@
             <a:lvl1pPr>
               <a:defRPr>
                 <a:solidFill>
-                  <a:srgbClr val="FFFFFF"/>
+                  <a:srgbClr val="FFFFFF">
+                    <a:alpha val="90000"/>
+                  </a:srgbClr>
                 </a:solidFill>
                 <a:effectLst>
                   <a:outerShdw blurRad="50800" dist="38100" dir="2700000" algn="tl" rotWithShape="0">
@@ -2635,7 +2629,7 @@
       </p:sp>
       <p:sp>
         <p:nvSpPr>
-          <p:cNvPr id="9" name="Footer Placeholder 8"/>
+          <p:cNvPr id="6" name="Footer Placeholder 5"/>
           <p:cNvSpPr>
             <a:spLocks noGrp="1"/>
           </p:cNvSpPr>
@@ -2645,8 +2639,8 @@
         </p:nvSpPr>
         <p:spPr>
           <a:xfrm>
-            <a:off x="804672" y="6236208"/>
-            <a:ext cx="5124797" cy="320040"/>
+            <a:off x="808523" y="6236208"/>
+            <a:ext cx="5103729" cy="320040"/>
           </a:xfrm>
         </p:spPr>
         <p:txBody>
@@ -2669,7 +2663,7 @@
       </p:sp>
       <p:sp>
         <p:nvSpPr>
-          <p:cNvPr id="10" name="Slide Number Placeholder 9"/>
+          <p:cNvPr id="7" name="Slide Number Placeholder 6"/>
           <p:cNvSpPr>
             <a:spLocks noGrp="1"/>
           </p:cNvSpPr>
@@ -2693,7 +2687,7 @@
     </p:spTree>
     <p:extLst>
       <p:ext uri="{BB962C8B-B14F-4D97-AF65-F5344CB8AC3E}">
-        <p14:creationId xmlns:p14="http://schemas.microsoft.com/office/powerpoint/2010/main" val="4138437546"/>
+        <p14:creationId xmlns:p14="http://schemas.microsoft.com/office/powerpoint/2010/main" val="2299282136"/>
       </p:ext>
     </p:extLst>
   </p:cSld>
@@ -2707,14 +2701,9 @@
 <p:sldMaster xmlns:a="http://schemas.openxmlformats.org/drawingml/2006/main" xmlns:r="http://schemas.openxmlformats.org/officeDocument/2006/relationships" xmlns:p="http://schemas.openxmlformats.org/presentationml/2006/main">
   <p:cSld>
     <p:bg>
-      <p:bgPr>
-        <a:solidFill>
-          <a:schemeClr val="bg1">
-            <a:lumMod val="95000"/>
-          </a:schemeClr>
-        </a:solidFill>
-        <a:effectLst/>
-      </p:bgPr>
+      <p:bgRef idx="1001">
+        <a:schemeClr val="bg2"/>
+      </p:bgRef>
     </p:bg>
     <p:spTree>
       <p:nvGrpSpPr>
@@ -2740,7 +2729,7 @@
             <p:ph type="title"/>
           </p:nvPr>
         </p:nvSpPr>
-        <p:spPr bwMode="black">
+        <p:spPr>
           <a:xfrm>
             <a:off x="2231136" y="964692"/>
             <a:ext cx="7729728" cy="1188720"/>
@@ -2749,11 +2738,14 @@
             <a:avLst/>
           </a:prstGeom>
           <a:solidFill>
-            <a:srgbClr val="FFFFFF"/>
+            <a:schemeClr val="bg1"/>
           </a:solidFill>
           <a:ln w="31750" cap="sq">
             <a:solidFill>
-              <a:srgbClr val="404040"/>
+              <a:schemeClr val="tx1">
+                <a:lumMod val="75000"/>
+                <a:lumOff val="25000"/>
+              </a:schemeClr>
             </a:solidFill>
             <a:miter lim="800000"/>
           </a:ln>
@@ -2960,23 +2952,23 @@
     </p:spTree>
     <p:extLst>
       <p:ext uri="{BB962C8B-B14F-4D97-AF65-F5344CB8AC3E}">
-        <p14:creationId xmlns:p14="http://schemas.microsoft.com/office/powerpoint/2010/main" val="2821449135"/>
+        <p14:creationId xmlns:p14="http://schemas.microsoft.com/office/powerpoint/2010/main" val="540801214"/>
       </p:ext>
     </p:extLst>
   </p:cSld>
   <p:clrMap bg1="lt1" tx1="dk1" bg2="lt2" tx2="dk2" accent1="accent1" accent2="accent2" accent3="accent3" accent4="accent4" accent5="accent5" accent6="accent6" hlink="hlink" folHlink="folHlink"/>
   <p:sldLayoutIdLst>
-    <p:sldLayoutId id="2147483661" r:id="rId1"/>
-    <p:sldLayoutId id="2147483662" r:id="rId2"/>
-    <p:sldLayoutId id="2147483663" r:id="rId3"/>
-    <p:sldLayoutId id="2147483664" r:id="rId4"/>
-    <p:sldLayoutId id="2147483665" r:id="rId5"/>
-    <p:sldLayoutId id="2147483666" r:id="rId6"/>
-    <p:sldLayoutId id="2147483667" r:id="rId7"/>
-    <p:sldLayoutId id="2147483668" r:id="rId8"/>
-    <p:sldLayoutId id="2147483669" r:id="rId9"/>
-    <p:sldLayoutId id="2147483670" r:id="rId10"/>
-    <p:sldLayoutId id="2147483671" r:id="rId11"/>
+    <p:sldLayoutId id="2147483685" r:id="rId1"/>
+    <p:sldLayoutId id="2147483686" r:id="rId2"/>
+    <p:sldLayoutId id="2147483687" r:id="rId3"/>
+    <p:sldLayoutId id="2147483688" r:id="rId4"/>
+    <p:sldLayoutId id="2147483689" r:id="rId5"/>
+    <p:sldLayoutId id="2147483690" r:id="rId6"/>
+    <p:sldLayoutId id="2147483691" r:id="rId7"/>
+    <p:sldLayoutId id="2147483692" r:id="rId8"/>
+    <p:sldLayoutId id="2147483693" r:id="rId9"/>
+    <p:sldLayoutId id="2147483694" r:id="rId10"/>
+    <p:sldLayoutId id="2147483695" r:id="rId11"/>
   </p:sldLayoutIdLst>
   <p:txStyles>
     <p:titleStyle>
@@ -2990,7 +2982,10 @@
         <a:buNone/>
         <a:defRPr sz="2800" kern="1200" cap="all" spc="200" baseline="0">
           <a:solidFill>
-            <a:srgbClr val="262626"/>
+            <a:schemeClr val="tx1">
+              <a:lumMod val="85000"/>
+              <a:lumOff val="15000"/>
+            </a:schemeClr>
           </a:solidFill>
           <a:latin typeface="+mj-lt"/>
           <a:ea typeface="+mj-ea"/>
@@ -3306,6 +3301,14 @@
 <file path=ppt/slides/slide1.xml><?xml version="1.0" encoding="utf-8"?>
 <p:sld xmlns:a="http://schemas.openxmlformats.org/drawingml/2006/main" xmlns:r="http://schemas.openxmlformats.org/officeDocument/2006/relationships" xmlns:p="http://schemas.openxmlformats.org/presentationml/2006/main">
   <p:cSld>
+    <p:bg>
+      <p:bgPr>
+        <a:solidFill>
+          <a:srgbClr val="245B92"/>
+        </a:solidFill>
+        <a:effectLst/>
+      </p:bgPr>
+    </p:bg>
     <p:spTree>
       <p:nvGrpSpPr>
         <p:cNvPr id="1" name=""/>
@@ -3407,7 +3410,7 @@
         </p:nvSpPr>
         <p:spPr>
           <a:xfrm>
-            <a:off x="9501494" y="3405793"/>
+            <a:off x="9501494" y="3778772"/>
             <a:ext cx="2375574" cy="461558"/>
           </a:xfrm>
           <a:prstGeom prst="rect">
@@ -3667,7 +3670,7 @@
         </p:blipFill>
         <p:spPr>
           <a:xfrm>
-            <a:off x="360714" y="118753"/>
+            <a:off x="214391" y="115332"/>
             <a:ext cx="9140780" cy="4315649"/>
           </a:xfrm>
           <a:prstGeom prst="rect">
@@ -3689,8 +3692,18 @@
 </file>
 
 <file path=ppt/slides/slide10.xml><?xml version="1.0" encoding="utf-8"?>
-<p:sld xmlns:a="http://schemas.openxmlformats.org/drawingml/2006/main" xmlns:r="http://schemas.openxmlformats.org/officeDocument/2006/relationships" xmlns:p="http://schemas.openxmlformats.org/presentationml/2006/main">
+<p:sld xmlns:a="http://schemas.openxmlformats.org/drawingml/2006/main" xmlns:r="http://schemas.openxmlformats.org/officeDocument/2006/relationships" xmlns:p="http://schemas.openxmlformats.org/presentationml/2006/main" showMasterSp="0">
   <p:cSld>
+    <p:bg>
+      <p:bgPr>
+        <a:solidFill>
+          <a:schemeClr val="bg2">
+            <a:alpha val="0"/>
+          </a:schemeClr>
+        </a:solidFill>
+        <a:effectLst/>
+      </p:bgPr>
+    </p:bg>
     <p:spTree>
       <p:nvGrpSpPr>
         <p:cNvPr id="1" name=""/>
@@ -3723,17 +3736,19 @@
         </p:nvSpPr>
         <p:spPr>
           <a:xfrm>
-            <a:off x="1786293" y="285071"/>
-            <a:ext cx="7729728" cy="1188720"/>
-          </a:xfrm>
-        </p:spPr>
-        <p:txBody>
-          <a:bodyPr/>
+            <a:off x="3373884" y="295704"/>
+            <a:ext cx="4805798" cy="682492"/>
+          </a:xfrm>
+        </p:spPr>
+        <p:txBody>
+          <a:bodyPr>
+            <a:normAutofit fontScale="90000"/>
+          </a:bodyPr>
           <a:lstStyle/>
           <a:p>
             <a:r>
               <a:rPr lang="en-US" dirty="0"/>
-              <a:t>Description of the Data</a:t>
+              <a:t>Data description</a:t>
             </a:r>
           </a:p>
         </p:txBody>
@@ -3766,18 +3781,28 @@
           </a:bodyPr>
           <a:lstStyle/>
           <a:p>
-            <a:r>
-              <a:rPr lang="en-US" sz="2800" dirty="0"/>
+            <a:pPr>
+              <a:lnSpc>
+                <a:spcPct val="150000"/>
+              </a:lnSpc>
+            </a:pPr>
+            <a:r>
+              <a:rPr lang="en-US" sz="3200" dirty="0"/>
               <a:t>Number of observations (raw dataset) : 1,800,985</a:t>
             </a:r>
           </a:p>
           <a:p>
-            <a:r>
-              <a:rPr lang="en-US" sz="2800" dirty="0"/>
+            <a:pPr>
+              <a:lnSpc>
+                <a:spcPct val="150000"/>
+              </a:lnSpc>
+            </a:pPr>
+            <a:r>
+              <a:rPr lang="en-US" sz="3200" dirty="0"/>
               <a:t>Number of observations (after cleanup) : </a:t>
             </a:r>
             <a:r>
-              <a:rPr lang="en-US" sz="2800" dirty="0">
+              <a:rPr lang="en-US" sz="3200" dirty="0">
                 <a:solidFill>
                   <a:srgbClr val="FF0000"/>
                 </a:solidFill>
@@ -3786,14 +3811,24 @@
             </a:r>
           </a:p>
           <a:p>
-            <a:r>
-              <a:rPr lang="en-US" sz="2800" dirty="0"/>
+            <a:pPr>
+              <a:lnSpc>
+                <a:spcPct val="150000"/>
+              </a:lnSpc>
+            </a:pPr>
+            <a:r>
+              <a:rPr lang="en-US" sz="3200" dirty="0"/>
               <a:t>Years (raw dataset) : 2010 to 2018 (August)</a:t>
             </a:r>
           </a:p>
           <a:p>
-            <a:r>
-              <a:rPr lang="en-US" sz="2800" dirty="0"/>
+            <a:pPr>
+              <a:lnSpc>
+                <a:spcPct val="150000"/>
+              </a:lnSpc>
+            </a:pPr>
+            <a:r>
+              <a:rPr lang="en-US" sz="3200" dirty="0"/>
               <a:t>Years (included in our analysis): 2010 to 2017</a:t>
             </a:r>
           </a:p>
@@ -3813,8 +3848,18 @@
 </file>
 
 <file path=ppt/slides/slide11.xml><?xml version="1.0" encoding="utf-8"?>
-<p:sld xmlns:a="http://schemas.openxmlformats.org/drawingml/2006/main" xmlns:r="http://schemas.openxmlformats.org/officeDocument/2006/relationships" xmlns:p="http://schemas.openxmlformats.org/presentationml/2006/main">
+<p:sld xmlns:a="http://schemas.openxmlformats.org/drawingml/2006/main" xmlns:r="http://schemas.openxmlformats.org/officeDocument/2006/relationships" xmlns:p="http://schemas.openxmlformats.org/presentationml/2006/main" showMasterSp="0">
   <p:cSld>
+    <p:bg>
+      <p:bgPr>
+        <a:solidFill>
+          <a:schemeClr val="bg2">
+            <a:alpha val="0"/>
+          </a:schemeClr>
+        </a:solidFill>
+        <a:effectLst/>
+      </p:bgPr>
+    </p:bg>
     <p:spTree>
       <p:nvGrpSpPr>
         <p:cNvPr id="1" name=""/>
@@ -4027,8 +4072,18 @@
 </file>
 
 <file path=ppt/slides/slide12.xml><?xml version="1.0" encoding="utf-8"?>
-<p:sld xmlns:a="http://schemas.openxmlformats.org/drawingml/2006/main" xmlns:r="http://schemas.openxmlformats.org/officeDocument/2006/relationships" xmlns:p="http://schemas.openxmlformats.org/presentationml/2006/main">
+<p:sld xmlns:a="http://schemas.openxmlformats.org/drawingml/2006/main" xmlns:r="http://schemas.openxmlformats.org/officeDocument/2006/relationships" xmlns:p="http://schemas.openxmlformats.org/presentationml/2006/main" showMasterSp="0">
   <p:cSld>
+    <p:bg>
+      <p:bgPr>
+        <a:solidFill>
+          <a:schemeClr val="bg2">
+            <a:alpha val="0"/>
+          </a:schemeClr>
+        </a:solidFill>
+        <a:effectLst/>
+      </p:bgPr>
+    </p:bg>
     <p:spTree>
       <p:nvGrpSpPr>
         <p:cNvPr id="1" name=""/>
@@ -4136,7 +4191,7 @@
         </p:nvSpPr>
         <p:spPr>
           <a:xfrm>
-            <a:off x="679622" y="1533102"/>
+            <a:off x="977333" y="1660291"/>
             <a:ext cx="10317892" cy="4524315"/>
           </a:xfrm>
           <a:prstGeom prst="rect">
@@ -4170,8 +4225,18 @@
 </file>
 
 <file path=ppt/slides/slide13.xml><?xml version="1.0" encoding="utf-8"?>
-<p:sld xmlns:a="http://schemas.openxmlformats.org/drawingml/2006/main" xmlns:r="http://schemas.openxmlformats.org/officeDocument/2006/relationships" xmlns:p="http://schemas.openxmlformats.org/presentationml/2006/main">
+<p:sld xmlns:a="http://schemas.openxmlformats.org/drawingml/2006/main" xmlns:r="http://schemas.openxmlformats.org/officeDocument/2006/relationships" xmlns:p="http://schemas.openxmlformats.org/presentationml/2006/main" showMasterSp="0">
   <p:cSld>
+    <p:bg>
+      <p:bgPr>
+        <a:solidFill>
+          <a:schemeClr val="bg2">
+            <a:alpha val="4000"/>
+          </a:schemeClr>
+        </a:solidFill>
+        <a:effectLst/>
+      </p:bgPr>
+    </p:bg>
     <p:spTree>
       <p:nvGrpSpPr>
         <p:cNvPr id="1" name=""/>
@@ -4221,55 +4286,6 @@
           </a:p>
         </p:txBody>
       </p:sp>
-      <p:sp>
-        <p:nvSpPr>
-          <p:cNvPr id="2" name="TextBox 1">
-            <a:extLst>
-              <a:ext uri="{FF2B5EF4-FFF2-40B4-BE49-F238E27FC236}">
-                <a16:creationId xmlns:a16="http://schemas.microsoft.com/office/drawing/2014/main" id="{420591FE-EB38-0949-8A8A-3724CAC605FC}"/>
-              </a:ext>
-            </a:extLst>
-          </p:cNvPr>
-          <p:cNvSpPr txBox="1"/>
-          <p:nvPr/>
-        </p:nvSpPr>
-        <p:spPr>
-          <a:xfrm>
-            <a:off x="8019535" y="345989"/>
-            <a:ext cx="3620530" cy="1200329"/>
-          </a:xfrm>
-          <a:prstGeom prst="rect">
-            <a:avLst/>
-          </a:prstGeom>
-          <a:noFill/>
-        </p:spPr>
-        <p:txBody>
-          <a:bodyPr wrap="square" rtlCol="0">
-            <a:spAutoFit/>
-          </a:bodyPr>
-          <a:lstStyle/>
-          <a:p>
-            <a:r>
-              <a:rPr lang="en-US" dirty="0">
-                <a:solidFill>
-                  <a:srgbClr val="FF0000"/>
-                </a:solidFill>
-              </a:rPr>
-              <a:t>Need a legend here as well: </a:t>
-            </a:r>
-          </a:p>
-          <a:p>
-            <a:r>
-              <a:rPr lang="en-US" dirty="0">
-                <a:solidFill>
-                  <a:srgbClr val="FF0000"/>
-                </a:solidFill>
-              </a:rPr>
-              <a:t>For the year? I Am assuming this is for all the years in our dataset for the years 2010 to 2017</a:t>
-            </a:r>
-          </a:p>
-        </p:txBody>
-      </p:sp>
       <p:pic>
         <p:nvPicPr>
           <p:cNvPr id="8" name="Content Placeholder 7">
@@ -4299,6 +4315,55 @@
           </a:xfrm>
         </p:spPr>
       </p:pic>
+      <p:sp>
+        <p:nvSpPr>
+          <p:cNvPr id="2" name="TextBox 1">
+            <a:extLst>
+              <a:ext uri="{FF2B5EF4-FFF2-40B4-BE49-F238E27FC236}">
+                <a16:creationId xmlns:a16="http://schemas.microsoft.com/office/drawing/2014/main" id="{420591FE-EB38-0949-8A8A-3724CAC605FC}"/>
+              </a:ext>
+            </a:extLst>
+          </p:cNvPr>
+          <p:cNvSpPr txBox="1"/>
+          <p:nvPr/>
+        </p:nvSpPr>
+        <p:spPr>
+          <a:xfrm>
+            <a:off x="8019535" y="345989"/>
+            <a:ext cx="3620530" cy="1200329"/>
+          </a:xfrm>
+          <a:prstGeom prst="rect">
+            <a:avLst/>
+          </a:prstGeom>
+          <a:noFill/>
+        </p:spPr>
+        <p:txBody>
+          <a:bodyPr wrap="square" rtlCol="0">
+            <a:spAutoFit/>
+          </a:bodyPr>
+          <a:lstStyle/>
+          <a:p>
+            <a:r>
+              <a:rPr lang="en-US" dirty="0">
+                <a:solidFill>
+                  <a:srgbClr val="FF0000"/>
+                </a:solidFill>
+              </a:rPr>
+              <a:t>Need a legend here as well: </a:t>
+            </a:r>
+          </a:p>
+          <a:p>
+            <a:r>
+              <a:rPr lang="en-US" dirty="0">
+                <a:solidFill>
+                  <a:srgbClr val="FF0000"/>
+                </a:solidFill>
+              </a:rPr>
+              <a:t>For the year? I Am assuming this is for all the years in our dataset for the years 2010 to 2017</a:t>
+            </a:r>
+          </a:p>
+        </p:txBody>
+      </p:sp>
     </p:spTree>
     <p:extLst>
       <p:ext uri="{BB962C8B-B14F-4D97-AF65-F5344CB8AC3E}">
@@ -4313,8 +4378,18 @@
 </file>
 
 <file path=ppt/slides/slide14.xml><?xml version="1.0" encoding="utf-8"?>
-<p:sld xmlns:a="http://schemas.openxmlformats.org/drawingml/2006/main" xmlns:r="http://schemas.openxmlformats.org/officeDocument/2006/relationships" xmlns:p="http://schemas.openxmlformats.org/presentationml/2006/main">
+<p:sld xmlns:a="http://schemas.openxmlformats.org/drawingml/2006/main" xmlns:r="http://schemas.openxmlformats.org/officeDocument/2006/relationships" xmlns:p="http://schemas.openxmlformats.org/presentationml/2006/main" showMasterSp="0">
   <p:cSld>
+    <p:bg>
+      <p:bgPr>
+        <a:solidFill>
+          <a:schemeClr val="bg2">
+            <a:alpha val="4000"/>
+          </a:schemeClr>
+        </a:solidFill>
+        <a:effectLst/>
+      </p:bgPr>
+    </p:bg>
     <p:spTree>
       <p:nvGrpSpPr>
         <p:cNvPr id="1" name=""/>
@@ -4329,6 +4404,41 @@
           <a:chExt cx="0" cy="0"/>
         </a:xfrm>
       </p:grpSpPr>
+      <p:sp>
+        <p:nvSpPr>
+          <p:cNvPr id="5" name="Title 1">
+            <a:extLst>
+              <a:ext uri="{FF2B5EF4-FFF2-40B4-BE49-F238E27FC236}">
+                <a16:creationId xmlns:a16="http://schemas.microsoft.com/office/drawing/2014/main" id="{6323AEB7-BC1E-0949-9F29-15387A72DEDC}"/>
+              </a:ext>
+            </a:extLst>
+          </p:cNvPr>
+          <p:cNvSpPr>
+            <a:spLocks noGrp="1"/>
+          </p:cNvSpPr>
+          <p:nvPr>
+            <p:ph type="title"/>
+          </p:nvPr>
+        </p:nvSpPr>
+        <p:spPr>
+          <a:xfrm>
+            <a:off x="261882" y="105474"/>
+            <a:ext cx="4841459" cy="759498"/>
+          </a:xfrm>
+        </p:spPr>
+        <p:txBody>
+          <a:bodyPr>
+            <a:normAutofit fontScale="90000"/>
+          </a:bodyPr>
+          <a:lstStyle/>
+          <a:p>
+            <a:r>
+              <a:rPr lang="en-US" dirty="0"/>
+              <a:t>Trends from our data</a:t>
+            </a:r>
+          </a:p>
+        </p:txBody>
+      </p:sp>
       <p:pic>
         <p:nvPicPr>
           <p:cNvPr id="4" name="Content Placeholder 3">
@@ -4353,49 +4463,14 @@
         </p:blipFill>
         <p:spPr>
           <a:xfrm>
-            <a:off x="1396313" y="994504"/>
-            <a:ext cx="9648205" cy="5563913"/>
+            <a:off x="261883" y="1185892"/>
+            <a:ext cx="7512687" cy="4332406"/>
           </a:xfrm>
           <a:prstGeom prst="rect">
             <a:avLst/>
           </a:prstGeom>
         </p:spPr>
       </p:pic>
-      <p:sp>
-        <p:nvSpPr>
-          <p:cNvPr id="5" name="Title 1">
-            <a:extLst>
-              <a:ext uri="{FF2B5EF4-FFF2-40B4-BE49-F238E27FC236}">
-                <a16:creationId xmlns:a16="http://schemas.microsoft.com/office/drawing/2014/main" id="{6323AEB7-BC1E-0949-9F29-15387A72DEDC}"/>
-              </a:ext>
-            </a:extLst>
-          </p:cNvPr>
-          <p:cNvSpPr>
-            <a:spLocks noGrp="1"/>
-          </p:cNvSpPr>
-          <p:nvPr>
-            <p:ph type="title"/>
-          </p:nvPr>
-        </p:nvSpPr>
-        <p:spPr>
-          <a:xfrm>
-            <a:off x="261882" y="105474"/>
-            <a:ext cx="4841459" cy="759498"/>
-          </a:xfrm>
-        </p:spPr>
-        <p:txBody>
-          <a:bodyPr>
-            <a:normAutofit fontScale="90000"/>
-          </a:bodyPr>
-          <a:lstStyle/>
-          <a:p>
-            <a:r>
-              <a:rPr lang="en-US" dirty="0"/>
-              <a:t>Trends from our data</a:t>
-            </a:r>
-          </a:p>
-        </p:txBody>
-      </p:sp>
     </p:spTree>
     <p:extLst>
       <p:ext uri="{BB962C8B-B14F-4D97-AF65-F5344CB8AC3E}">
@@ -4410,8 +4485,18 @@
 </file>
 
 <file path=ppt/slides/slide15.xml><?xml version="1.0" encoding="utf-8"?>
-<p:sld xmlns:a="http://schemas.openxmlformats.org/drawingml/2006/main" xmlns:r="http://schemas.openxmlformats.org/officeDocument/2006/relationships" xmlns:p="http://schemas.openxmlformats.org/presentationml/2006/main">
+<p:sld xmlns:a="http://schemas.openxmlformats.org/drawingml/2006/main" xmlns:r="http://schemas.openxmlformats.org/officeDocument/2006/relationships" xmlns:p="http://schemas.openxmlformats.org/presentationml/2006/main" showMasterSp="0">
   <p:cSld>
+    <p:bg>
+      <p:bgPr>
+        <a:solidFill>
+          <a:schemeClr val="bg2">
+            <a:alpha val="4000"/>
+          </a:schemeClr>
+        </a:solidFill>
+        <a:effectLst/>
+      </p:bgPr>
+    </p:bg>
     <p:spTree>
       <p:nvGrpSpPr>
         <p:cNvPr id="1" name=""/>
@@ -4444,7 +4529,7 @@
         </p:nvSpPr>
         <p:spPr>
           <a:xfrm>
-            <a:off x="261882" y="105474"/>
+            <a:off x="261882" y="435085"/>
             <a:ext cx="4841459" cy="759498"/>
           </a:xfrm>
         </p:spPr>
@@ -4483,8 +4568,8 @@
         </p:blipFill>
         <p:spPr>
           <a:xfrm>
-            <a:off x="1881331" y="1070969"/>
-            <a:ext cx="8490967" cy="5660645"/>
+            <a:off x="261882" y="1502926"/>
+            <a:ext cx="6320118" cy="4213412"/>
           </a:xfrm>
           <a:prstGeom prst="rect">
             <a:avLst/>
@@ -4507,6 +4592,16 @@
 <file path=ppt/slides/slide16.xml><?xml version="1.0" encoding="utf-8"?>
 <p:sld xmlns:a="http://schemas.openxmlformats.org/drawingml/2006/main" xmlns:r="http://schemas.openxmlformats.org/officeDocument/2006/relationships" xmlns:p="http://schemas.openxmlformats.org/presentationml/2006/main">
   <p:cSld>
+    <p:bg>
+      <p:bgPr>
+        <a:solidFill>
+          <a:schemeClr val="bg2">
+            <a:alpha val="4000"/>
+          </a:schemeClr>
+        </a:solidFill>
+        <a:effectLst/>
+      </p:bgPr>
+    </p:bg>
     <p:spTree>
       <p:nvGrpSpPr>
         <p:cNvPr id="1" name=""/>
@@ -4539,19 +4634,19 @@
         </p:nvSpPr>
         <p:spPr>
           <a:xfrm>
-            <a:off x="2066298" y="482779"/>
-            <a:ext cx="7729728" cy="1188720"/>
+            <a:off x="2449136" y="619049"/>
+            <a:ext cx="7353614" cy="563968"/>
           </a:xfrm>
         </p:spPr>
         <p:txBody>
           <a:bodyPr>
-            <a:normAutofit/>
+            <a:normAutofit fontScale="90000"/>
           </a:bodyPr>
           <a:lstStyle/>
           <a:p>
             <a:r>
               <a:rPr lang="en-US" sz="4000" dirty="0"/>
-              <a:t>Flow of presentation</a:t>
+              <a:t>Rest of the presentation</a:t>
             </a:r>
           </a:p>
         </p:txBody>
@@ -4570,8 +4665,8 @@
         </p:nvSpPr>
         <p:spPr>
           <a:xfrm>
-            <a:off x="1220191" y="1883572"/>
-            <a:ext cx="9594937" cy="3539430"/>
+            <a:off x="1297172" y="1637414"/>
+            <a:ext cx="9626240" cy="2487669"/>
           </a:xfrm>
           <a:prstGeom prst="rect">
             <a:avLst/>
@@ -4584,47 +4679,15 @@
           </a:bodyPr>
           <a:lstStyle/>
           <a:p>
-            <a:pPr marL="342900" indent="-342900">
-              <a:buAutoNum type="arabicPeriod"/>
+            <a:pPr marL="571500" indent="-571500">
+              <a:lnSpc>
+                <a:spcPct val="150000"/>
+              </a:lnSpc>
+              <a:buFont typeface="Arial" panose="020B0604020202020204" pitchFamily="34" charset="0"/>
+              <a:buChar char="•"/>
             </a:pPr>
             <a:r>
-              <a:rPr lang="en-US" sz="3200" strike="sngStrike" dirty="0"/>
-              <a:t>Questions</a:t>
-            </a:r>
-          </a:p>
-          <a:p>
-            <a:pPr marL="342900" indent="-342900">
-              <a:buAutoNum type="arabicPeriod"/>
-            </a:pPr>
-            <a:r>
-              <a:rPr lang="en-US" sz="3200" strike="sngStrike" dirty="0"/>
-              <a:t>Data Sources</a:t>
-            </a:r>
-          </a:p>
-          <a:p>
-            <a:pPr marL="342900" indent="-342900">
-              <a:buAutoNum type="arabicPeriod"/>
-            </a:pPr>
-            <a:r>
-              <a:rPr lang="en-US" sz="3200" strike="sngStrike" dirty="0"/>
-              <a:t>Data Cleaning &amp; Technical Applications</a:t>
-            </a:r>
-          </a:p>
-          <a:p>
-            <a:pPr marL="342900" indent="-342900">
-              <a:buAutoNum type="arabicPeriod"/>
-            </a:pPr>
-            <a:r>
-              <a:rPr lang="en-US" sz="3200" strike="sngStrike" dirty="0"/>
-              <a:t>Data Description</a:t>
-            </a:r>
-          </a:p>
-          <a:p>
-            <a:pPr marL="342900" indent="-342900">
-              <a:buAutoNum type="arabicPeriod"/>
-            </a:pPr>
-            <a:r>
-              <a:rPr lang="en-US" sz="3200" dirty="0">
+              <a:rPr lang="en-US" sz="3600" dirty="0">
                 <a:solidFill>
                   <a:srgbClr val="FF0000"/>
                 </a:solidFill>
@@ -4633,20 +4696,28 @@
             </a:r>
           </a:p>
           <a:p>
-            <a:pPr marL="342900" indent="-342900">
-              <a:buAutoNum type="arabicPeriod"/>
+            <a:pPr marL="571500" indent="-571500">
+              <a:lnSpc>
+                <a:spcPct val="150000"/>
+              </a:lnSpc>
+              <a:buFont typeface="Arial" panose="020B0604020202020204" pitchFamily="34" charset="0"/>
+              <a:buChar char="•"/>
             </a:pPr>
             <a:r>
-              <a:rPr lang="en-US" sz="3200" dirty="0"/>
+              <a:rPr lang="en-US" sz="3600" dirty="0"/>
               <a:t>Conclusions</a:t>
             </a:r>
           </a:p>
           <a:p>
-            <a:pPr marL="342900" indent="-342900">
-              <a:buAutoNum type="arabicPeriod"/>
+            <a:pPr marL="571500" indent="-571500">
+              <a:lnSpc>
+                <a:spcPct val="150000"/>
+              </a:lnSpc>
+              <a:buFont typeface="Arial" panose="020B0604020202020204" pitchFamily="34" charset="0"/>
+              <a:buChar char="•"/>
             </a:pPr>
             <a:r>
-              <a:rPr lang="en-US" sz="3200" dirty="0"/>
+              <a:rPr lang="en-US" sz="3600" dirty="0"/>
               <a:t>Future Work/Assignments</a:t>
             </a:r>
           </a:p>
@@ -4655,7 +4726,7 @@
     </p:spTree>
     <p:extLst>
       <p:ext uri="{BB962C8B-B14F-4D97-AF65-F5344CB8AC3E}">
-        <p14:creationId xmlns:p14="http://schemas.microsoft.com/office/powerpoint/2010/main" val="2080924015"/>
+        <p14:creationId xmlns:p14="http://schemas.microsoft.com/office/powerpoint/2010/main" val="4256663096"/>
       </p:ext>
     </p:extLst>
   </p:cSld>
@@ -4666,7 +4737,355 @@
 </file>
 
 <file path=ppt/slides/slide17.xml><?xml version="1.0" encoding="utf-8"?>
-<p:sld xmlns:a="http://schemas.openxmlformats.org/drawingml/2006/main" xmlns:r="http://schemas.openxmlformats.org/officeDocument/2006/relationships" xmlns:p="http://schemas.openxmlformats.org/presentationml/2006/main">
+<p:sld xmlns:a="http://schemas.openxmlformats.org/drawingml/2006/main" xmlns:r="http://schemas.openxmlformats.org/officeDocument/2006/relationships" xmlns:p="http://schemas.openxmlformats.org/presentationml/2006/main" showMasterSp="0">
+  <p:cSld>
+    <p:bg>
+      <p:bgPr>
+        <a:solidFill>
+          <a:schemeClr val="bg2">
+            <a:alpha val="4000"/>
+          </a:schemeClr>
+        </a:solidFill>
+        <a:effectLst/>
+      </p:bgPr>
+    </p:bg>
+    <p:spTree>
+      <p:nvGrpSpPr>
+        <p:cNvPr id="1" name=""/>
+        <p:cNvGrpSpPr/>
+        <p:nvPr/>
+      </p:nvGrpSpPr>
+      <p:grpSpPr>
+        <a:xfrm>
+          <a:off x="0" y="0"/>
+          <a:ext cx="0" cy="0"/>
+          <a:chOff x="0" y="0"/>
+          <a:chExt cx="0" cy="0"/>
+        </a:xfrm>
+      </p:grpSpPr>
+      <p:sp>
+        <p:nvSpPr>
+          <p:cNvPr id="5" name="Title 1">
+            <a:extLst>
+              <a:ext uri="{FF2B5EF4-FFF2-40B4-BE49-F238E27FC236}">
+                <a16:creationId xmlns:a16="http://schemas.microsoft.com/office/drawing/2014/main" id="{FD53F7D5-6FBD-2E4D-9BFE-FEE56BDE23C0}"/>
+              </a:ext>
+            </a:extLst>
+          </p:cNvPr>
+          <p:cNvSpPr>
+            <a:spLocks noGrp="1"/>
+          </p:cNvSpPr>
+          <p:nvPr>
+            <p:ph type="title"/>
+          </p:nvPr>
+        </p:nvSpPr>
+        <p:spPr>
+          <a:xfrm>
+            <a:off x="261882" y="105474"/>
+            <a:ext cx="4841459" cy="759498"/>
+          </a:xfrm>
+        </p:spPr>
+        <p:txBody>
+          <a:bodyPr/>
+          <a:lstStyle/>
+          <a:p>
+            <a:r>
+              <a:rPr lang="en-US" dirty="0"/>
+              <a:t>Results</a:t>
+            </a:r>
+          </a:p>
+        </p:txBody>
+      </p:sp>
+      <p:pic>
+        <p:nvPicPr>
+          <p:cNvPr id="4" name="Content Placeholder 3">
+            <a:extLst>
+              <a:ext uri="{FF2B5EF4-FFF2-40B4-BE49-F238E27FC236}">
+                <a16:creationId xmlns:a16="http://schemas.microsoft.com/office/drawing/2014/main" id="{3FFCDBBB-BD50-0644-8E45-85BBA88654E2}"/>
+              </a:ext>
+            </a:extLst>
+          </p:cNvPr>
+          <p:cNvPicPr>
+            <a:picLocks noGrp="1" noChangeAspect="1"/>
+          </p:cNvPicPr>
+          <p:nvPr>
+            <p:ph idx="1"/>
+          </p:nvPr>
+        </p:nvPicPr>
+        <p:blipFill>
+          <a:blip r:embed="rId2"/>
+          <a:stretch>
+            <a:fillRect/>
+          </a:stretch>
+        </p:blipFill>
+        <p:spPr>
+          <a:xfrm>
+            <a:off x="535439" y="978597"/>
+            <a:ext cx="6748689" cy="4390845"/>
+          </a:xfrm>
+          <a:prstGeom prst="rect">
+            <a:avLst/>
+          </a:prstGeom>
+        </p:spPr>
+      </p:pic>
+      <p:sp>
+        <p:nvSpPr>
+          <p:cNvPr id="2" name="TextBox 1">
+            <a:extLst>
+              <a:ext uri="{FF2B5EF4-FFF2-40B4-BE49-F238E27FC236}">
+                <a16:creationId xmlns:a16="http://schemas.microsoft.com/office/drawing/2014/main" id="{9419A4C5-105B-8E46-91D1-CFC71A5C4BD4}"/>
+              </a:ext>
+            </a:extLst>
+          </p:cNvPr>
+          <p:cNvSpPr txBox="1"/>
+          <p:nvPr/>
+        </p:nvSpPr>
+        <p:spPr>
+          <a:xfrm>
+            <a:off x="8204886" y="864972"/>
+            <a:ext cx="3311611" cy="830997"/>
+          </a:xfrm>
+          <a:prstGeom prst="rect">
+            <a:avLst/>
+          </a:prstGeom>
+          <a:noFill/>
+        </p:spPr>
+        <p:txBody>
+          <a:bodyPr wrap="square" rtlCol="0">
+            <a:spAutoFit/>
+          </a:bodyPr>
+          <a:lstStyle/>
+          <a:p>
+            <a:r>
+              <a:rPr lang="en-US" sz="2400" dirty="0">
+                <a:solidFill>
+                  <a:srgbClr val="FF0000"/>
+                </a:solidFill>
+              </a:rPr>
+              <a:t>Need a legend for this pie chart</a:t>
+            </a:r>
+          </a:p>
+        </p:txBody>
+      </p:sp>
+    </p:spTree>
+    <p:extLst>
+      <p:ext uri="{BB962C8B-B14F-4D97-AF65-F5344CB8AC3E}">
+        <p14:creationId xmlns:p14="http://schemas.microsoft.com/office/powerpoint/2010/main" val="480767787"/>
+      </p:ext>
+    </p:extLst>
+  </p:cSld>
+  <p:clrMapOvr>
+    <a:masterClrMapping/>
+  </p:clrMapOvr>
+</p:sld>
+</file>
+
+<file path=ppt/slides/slide18.xml><?xml version="1.0" encoding="utf-8"?>
+<p:sld xmlns:a="http://schemas.openxmlformats.org/drawingml/2006/main" xmlns:r="http://schemas.openxmlformats.org/officeDocument/2006/relationships" xmlns:p="http://schemas.openxmlformats.org/presentationml/2006/main" showMasterSp="0">
+  <p:cSld>
+    <p:bg>
+      <p:bgPr>
+        <a:solidFill>
+          <a:schemeClr val="bg2">
+            <a:alpha val="4000"/>
+          </a:schemeClr>
+        </a:solidFill>
+        <a:effectLst/>
+      </p:bgPr>
+    </p:bg>
+    <p:spTree>
+      <p:nvGrpSpPr>
+        <p:cNvPr id="1" name=""/>
+        <p:cNvGrpSpPr/>
+        <p:nvPr/>
+      </p:nvGrpSpPr>
+      <p:grpSpPr>
+        <a:xfrm>
+          <a:off x="0" y="0"/>
+          <a:ext cx="0" cy="0"/>
+          <a:chOff x="0" y="0"/>
+          <a:chExt cx="0" cy="0"/>
+        </a:xfrm>
+      </p:grpSpPr>
+      <p:sp>
+        <p:nvSpPr>
+          <p:cNvPr id="2" name="Title 1">
+            <a:extLst>
+              <a:ext uri="{FF2B5EF4-FFF2-40B4-BE49-F238E27FC236}">
+                <a16:creationId xmlns:a16="http://schemas.microsoft.com/office/drawing/2014/main" id="{76A47BE7-C968-4C6E-B64E-28E7C87E7F1B}"/>
+              </a:ext>
+            </a:extLst>
+          </p:cNvPr>
+          <p:cNvSpPr>
+            <a:spLocks noGrp="1"/>
+          </p:cNvSpPr>
+          <p:nvPr>
+            <p:ph type="title"/>
+          </p:nvPr>
+        </p:nvSpPr>
+        <p:spPr>
+          <a:xfrm>
+            <a:off x="261882" y="105474"/>
+            <a:ext cx="4841459" cy="759498"/>
+          </a:xfrm>
+        </p:spPr>
+        <p:txBody>
+          <a:bodyPr/>
+          <a:lstStyle/>
+          <a:p>
+            <a:r>
+              <a:rPr lang="en-US" dirty="0"/>
+              <a:t>Results</a:t>
+            </a:r>
+          </a:p>
+        </p:txBody>
+      </p:sp>
+      <p:pic>
+        <p:nvPicPr>
+          <p:cNvPr id="5" name="Content Placeholder 4">
+            <a:extLst>
+              <a:ext uri="{FF2B5EF4-FFF2-40B4-BE49-F238E27FC236}">
+                <a16:creationId xmlns:a16="http://schemas.microsoft.com/office/drawing/2014/main" id="{860EB01D-266E-0243-A4B4-0268ADA7CAC4}"/>
+              </a:ext>
+            </a:extLst>
+          </p:cNvPr>
+          <p:cNvPicPr>
+            <a:picLocks noGrp="1" noChangeAspect="1"/>
+          </p:cNvPicPr>
+          <p:nvPr>
+            <p:ph idx="1"/>
+          </p:nvPr>
+        </p:nvPicPr>
+        <p:blipFill>
+          <a:blip r:embed="rId2"/>
+          <a:stretch>
+            <a:fillRect/>
+          </a:stretch>
+        </p:blipFill>
+        <p:spPr>
+          <a:xfrm>
+            <a:off x="261882" y="1452637"/>
+            <a:ext cx="6082542" cy="4055028"/>
+          </a:xfrm>
+        </p:spPr>
+      </p:pic>
+    </p:spTree>
+    <p:extLst>
+      <p:ext uri="{BB962C8B-B14F-4D97-AF65-F5344CB8AC3E}">
+        <p14:creationId xmlns:p14="http://schemas.microsoft.com/office/powerpoint/2010/main" val="796429050"/>
+      </p:ext>
+    </p:extLst>
+  </p:cSld>
+  <p:clrMapOvr>
+    <a:masterClrMapping/>
+  </p:clrMapOvr>
+</p:sld>
+</file>
+
+<file path=ppt/slides/slide19.xml><?xml version="1.0" encoding="utf-8"?>
+<p:sld xmlns:a="http://schemas.openxmlformats.org/drawingml/2006/main" xmlns:r="http://schemas.openxmlformats.org/officeDocument/2006/relationships" xmlns:p="http://schemas.openxmlformats.org/presentationml/2006/main" showMasterSp="0">
+  <p:cSld>
+    <p:bg>
+      <p:bgPr>
+        <a:solidFill>
+          <a:schemeClr val="bg2">
+            <a:alpha val="4000"/>
+          </a:schemeClr>
+        </a:solidFill>
+        <a:effectLst/>
+      </p:bgPr>
+    </p:bg>
+    <p:spTree>
+      <p:nvGrpSpPr>
+        <p:cNvPr id="1" name=""/>
+        <p:cNvGrpSpPr/>
+        <p:nvPr/>
+      </p:nvGrpSpPr>
+      <p:grpSpPr>
+        <a:xfrm>
+          <a:off x="0" y="0"/>
+          <a:ext cx="0" cy="0"/>
+          <a:chOff x="0" y="0"/>
+          <a:chExt cx="0" cy="0"/>
+        </a:xfrm>
+      </p:grpSpPr>
+      <p:sp>
+        <p:nvSpPr>
+          <p:cNvPr id="6" name="Title 1">
+            <a:extLst>
+              <a:ext uri="{FF2B5EF4-FFF2-40B4-BE49-F238E27FC236}">
+                <a16:creationId xmlns:a16="http://schemas.microsoft.com/office/drawing/2014/main" id="{C8C4C8C6-BF92-594C-977C-77D44E77D074}"/>
+              </a:ext>
+            </a:extLst>
+          </p:cNvPr>
+          <p:cNvSpPr>
+            <a:spLocks noGrp="1"/>
+          </p:cNvSpPr>
+          <p:nvPr>
+            <p:ph type="title"/>
+          </p:nvPr>
+        </p:nvSpPr>
+        <p:spPr>
+          <a:xfrm>
+            <a:off x="261882" y="105474"/>
+            <a:ext cx="4841459" cy="759498"/>
+          </a:xfrm>
+        </p:spPr>
+        <p:txBody>
+          <a:bodyPr/>
+          <a:lstStyle/>
+          <a:p>
+            <a:r>
+              <a:rPr lang="en-US" dirty="0"/>
+              <a:t>Results</a:t>
+            </a:r>
+          </a:p>
+        </p:txBody>
+      </p:sp>
+      <p:pic>
+        <p:nvPicPr>
+          <p:cNvPr id="5" name="Content Placeholder 4">
+            <a:extLst>
+              <a:ext uri="{FF2B5EF4-FFF2-40B4-BE49-F238E27FC236}">
+                <a16:creationId xmlns:a16="http://schemas.microsoft.com/office/drawing/2014/main" id="{94D9E8F3-492A-7D4C-B004-5C27B1F91C12}"/>
+              </a:ext>
+            </a:extLst>
+          </p:cNvPr>
+          <p:cNvPicPr>
+            <a:picLocks noGrp="1" noChangeAspect="1"/>
+          </p:cNvPicPr>
+          <p:nvPr>
+            <p:ph idx="1"/>
+          </p:nvPr>
+        </p:nvPicPr>
+        <p:blipFill>
+          <a:blip r:embed="rId2"/>
+          <a:stretch>
+            <a:fillRect/>
+          </a:stretch>
+        </p:blipFill>
+        <p:spPr>
+          <a:xfrm>
+            <a:off x="261882" y="1292475"/>
+            <a:ext cx="6099500" cy="4066333"/>
+          </a:xfrm>
+        </p:spPr>
+      </p:pic>
+    </p:spTree>
+    <p:extLst>
+      <p:ext uri="{BB962C8B-B14F-4D97-AF65-F5344CB8AC3E}">
+        <p14:creationId xmlns:p14="http://schemas.microsoft.com/office/powerpoint/2010/main" val="602088440"/>
+      </p:ext>
+    </p:extLst>
+  </p:cSld>
+  <p:clrMapOvr>
+    <a:masterClrMapping/>
+  </p:clrMapOvr>
+</p:sld>
+</file>
+
+<file path=ppt/slides/slide2.xml><?xml version="1.0" encoding="utf-8"?>
+<p:sld xmlns:a="http://schemas.openxmlformats.org/drawingml/2006/main" xmlns:r="http://schemas.openxmlformats.org/officeDocument/2006/relationships" xmlns:p="http://schemas.openxmlformats.org/presentationml/2006/main" showMasterSp="0" show="0">
   <p:cSld>
     <p:spTree>
       <p:nvGrpSpPr>
@@ -4682,44 +5101,47 @@
           <a:chExt cx="0" cy="0"/>
         </a:xfrm>
       </p:grpSpPr>
-      <p:pic>
-        <p:nvPicPr>
-          <p:cNvPr id="4" name="Content Placeholder 3">
+      <p:sp>
+        <p:nvSpPr>
+          <p:cNvPr id="2" name="Title 1">
             <a:extLst>
               <a:ext uri="{FF2B5EF4-FFF2-40B4-BE49-F238E27FC236}">
-                <a16:creationId xmlns:a16="http://schemas.microsoft.com/office/drawing/2014/main" id="{3FFCDBBB-BD50-0644-8E45-85BBA88654E2}"/>
+                <a16:creationId xmlns:a16="http://schemas.microsoft.com/office/drawing/2014/main" id="{CE142BD7-5B74-42AC-B344-097090A2BE04}"/>
               </a:ext>
             </a:extLst>
           </p:cNvPr>
-          <p:cNvPicPr>
-            <a:picLocks noGrp="1" noChangeAspect="1"/>
-          </p:cNvPicPr>
-          <p:nvPr>
-            <p:ph idx="1"/>
-          </p:nvPr>
-        </p:nvPicPr>
-        <p:blipFill>
-          <a:blip r:embed="rId2"/>
-          <a:stretch>
-            <a:fillRect/>
-          </a:stretch>
-        </p:blipFill>
-        <p:spPr>
-          <a:xfrm>
-            <a:off x="450378" y="1106187"/>
-            <a:ext cx="7359091" cy="4787986"/>
-          </a:xfrm>
-          <a:prstGeom prst="rect">
-            <a:avLst/>
-          </a:prstGeom>
-        </p:spPr>
-      </p:pic>
-      <p:sp>
-        <p:nvSpPr>
-          <p:cNvPr id="5" name="Title 1">
+          <p:cNvSpPr>
+            <a:spLocks noGrp="1"/>
+          </p:cNvSpPr>
+          <p:nvPr>
+            <p:ph type="title"/>
+          </p:nvPr>
+        </p:nvSpPr>
+        <p:spPr>
+          <a:xfrm>
+            <a:off x="1536858" y="366532"/>
+            <a:ext cx="8911687" cy="728701"/>
+          </a:xfrm>
+        </p:spPr>
+        <p:txBody>
+          <a:bodyPr>
+            <a:normAutofit fontScale="90000"/>
+          </a:bodyPr>
+          <a:lstStyle/>
+          <a:p>
+            <a:r>
+              <a:rPr lang="en-US" dirty="0"/>
+              <a:t>Project Requirements</a:t>
+            </a:r>
+          </a:p>
+        </p:txBody>
+      </p:sp>
+      <p:sp>
+        <p:nvSpPr>
+          <p:cNvPr id="3" name="Content Placeholder 2">
             <a:extLst>
               <a:ext uri="{FF2B5EF4-FFF2-40B4-BE49-F238E27FC236}">
-                <a16:creationId xmlns:a16="http://schemas.microsoft.com/office/drawing/2014/main" id="{FD53F7D5-6FBD-2E4D-9BFE-FEE56BDE23C0}"/>
+                <a16:creationId xmlns:a16="http://schemas.microsoft.com/office/drawing/2014/main" id="{2C60C703-4583-4865-9A82-536B44D243F5}"/>
               </a:ext>
             </a:extLst>
           </p:cNvPr>
@@ -4727,61 +5149,89 @@
             <a:spLocks noGrp="1"/>
           </p:cNvSpPr>
           <p:nvPr>
-            <p:ph type="title"/>
-          </p:nvPr>
-        </p:nvSpPr>
-        <p:spPr>
-          <a:xfrm>
-            <a:off x="261882" y="105474"/>
-            <a:ext cx="4841459" cy="759498"/>
-          </a:xfrm>
-        </p:spPr>
-        <p:txBody>
-          <a:bodyPr/>
-          <a:lstStyle/>
-          <a:p>
-            <a:r>
-              <a:rPr lang="en-US" dirty="0"/>
-              <a:t>Results</a:t>
-            </a:r>
-          </a:p>
-        </p:txBody>
-      </p:sp>
-      <p:sp>
-        <p:nvSpPr>
-          <p:cNvPr id="2" name="TextBox 1">
-            <a:extLst>
-              <a:ext uri="{FF2B5EF4-FFF2-40B4-BE49-F238E27FC236}">
-                <a16:creationId xmlns:a16="http://schemas.microsoft.com/office/drawing/2014/main" id="{9419A4C5-105B-8E46-91D1-CFC71A5C4BD4}"/>
-              </a:ext>
-            </a:extLst>
-          </p:cNvPr>
-          <p:cNvSpPr txBox="1"/>
-          <p:nvPr/>
-        </p:nvSpPr>
-        <p:spPr>
-          <a:xfrm>
-            <a:off x="8204886" y="864972"/>
-            <a:ext cx="3311611" cy="830997"/>
-          </a:xfrm>
-          <a:prstGeom prst="rect">
-            <a:avLst/>
-          </a:prstGeom>
-          <a:noFill/>
-        </p:spPr>
-        <p:txBody>
-          <a:bodyPr wrap="square" rtlCol="0">
-            <a:spAutoFit/>
+            <p:ph idx="1"/>
+          </p:nvPr>
+        </p:nvSpPr>
+        <p:spPr>
+          <a:xfrm>
+            <a:off x="243655" y="1221057"/>
+            <a:ext cx="11285671" cy="5229170"/>
+          </a:xfrm>
+        </p:spPr>
+        <p:txBody>
+          <a:bodyPr>
+            <a:noAutofit/>
           </a:bodyPr>
           <a:lstStyle/>
           <a:p>
             <a:r>
-              <a:rPr lang="en-US" sz="2400" dirty="0">
-                <a:solidFill>
-                  <a:srgbClr val="FF0000"/>
-                </a:solidFill>
-              </a:rPr>
-              <a:t>Need a legend for this pie chart</a:t>
+              <a:rPr lang="en-US" sz="2000" dirty="0"/>
+              <a:t>The technical requirements for Project 1 are as follows.</a:t>
+            </a:r>
+          </a:p>
+          <a:p>
+            <a:pPr lvl="1"/>
+            <a:r>
+              <a:rPr lang="en-US" sz="2000" dirty="0"/>
+              <a:t>Use Pandas to clean and format your data set(s)</a:t>
+            </a:r>
+          </a:p>
+          <a:p>
+            <a:pPr lvl="1"/>
+            <a:r>
+              <a:rPr lang="en-US" sz="2000" dirty="0"/>
+              <a:t>Create a </a:t>
+            </a:r>
+            <a:r>
+              <a:rPr lang="en-US" sz="2000" dirty="0" err="1"/>
+              <a:t>Jupyter</a:t>
+            </a:r>
+            <a:r>
+              <a:rPr lang="en-US" sz="2000" dirty="0"/>
+              <a:t> Notebook describing the data exploration and cleanup process</a:t>
+            </a:r>
+          </a:p>
+          <a:p>
+            <a:pPr lvl="1"/>
+            <a:r>
+              <a:rPr lang="en-US" sz="2000" dirty="0"/>
+              <a:t>Create a </a:t>
+            </a:r>
+            <a:r>
+              <a:rPr lang="en-US" sz="2000" dirty="0" err="1"/>
+              <a:t>Jupyter</a:t>
+            </a:r>
+            <a:r>
+              <a:rPr lang="en-US" sz="2000" dirty="0"/>
+              <a:t> Notebook illustrating the final data analysis</a:t>
+            </a:r>
+          </a:p>
+          <a:p>
+            <a:pPr lvl="1"/>
+            <a:r>
+              <a:rPr lang="en-US" sz="2000" dirty="0"/>
+              <a:t>Use Matplotlib to create a total of 6-8 visualizations of your data (ideally, at least 2 per "question" you ask of your data)</a:t>
+            </a:r>
+          </a:p>
+          <a:p>
+            <a:pPr lvl="1"/>
+            <a:r>
+              <a:rPr lang="en-US" sz="2000" dirty="0"/>
+              <a:t>Save PNG images of your visualizations to distribute to the class and instructional team, and for inclusion in your presentation</a:t>
+            </a:r>
+          </a:p>
+          <a:p>
+            <a:pPr lvl="1"/>
+            <a:r>
+              <a:rPr lang="en-US" sz="2000" dirty="0"/>
+              <a:t>Optionally, use at least one API, if you can find an API with data pertinent to your primary research questions</a:t>
+            </a:r>
+          </a:p>
+          <a:p>
+            <a:pPr lvl="1"/>
+            <a:r>
+              <a:rPr lang="en-US" sz="2000" dirty="0"/>
+              <a:t>Create a write-up summarizing your major findings. This should include a heading for each "question" you asked of your data, and under each heading, a short description of what you found and any relevant plots.</a:t>
             </a:r>
           </a:p>
         </p:txBody>
@@ -4789,7 +5239,7 @@
     </p:spTree>
     <p:extLst>
       <p:ext uri="{BB962C8B-B14F-4D97-AF65-F5344CB8AC3E}">
-        <p14:creationId xmlns:p14="http://schemas.microsoft.com/office/powerpoint/2010/main" val="480767787"/>
+        <p14:creationId xmlns:p14="http://schemas.microsoft.com/office/powerpoint/2010/main" val="676392575"/>
       </p:ext>
     </p:extLst>
   </p:cSld>
@@ -4799,9 +5249,19 @@
 </p:sld>
 </file>
 
-<file path=ppt/slides/slide18.xml><?xml version="1.0" encoding="utf-8"?>
-<p:sld xmlns:a="http://schemas.openxmlformats.org/drawingml/2006/main" xmlns:r="http://schemas.openxmlformats.org/officeDocument/2006/relationships" xmlns:p="http://schemas.openxmlformats.org/presentationml/2006/main">
+<file path=ppt/slides/slide20.xml><?xml version="1.0" encoding="utf-8"?>
+<p:sld xmlns:a="http://schemas.openxmlformats.org/drawingml/2006/main" xmlns:r="http://schemas.openxmlformats.org/officeDocument/2006/relationships" xmlns:p="http://schemas.openxmlformats.org/presentationml/2006/main" showMasterSp="0">
   <p:cSld>
+    <p:bg>
+      <p:bgPr>
+        <a:solidFill>
+          <a:schemeClr val="bg2">
+            <a:alpha val="4000"/>
+          </a:schemeClr>
+        </a:solidFill>
+        <a:effectLst/>
+      </p:bgPr>
+    </p:bg>
     <p:spTree>
       <p:nvGrpSpPr>
         <p:cNvPr id="1" name=""/>
@@ -4818,10 +5278,10 @@
       </p:grpSpPr>
       <p:sp>
         <p:nvSpPr>
-          <p:cNvPr id="2" name="Title 1">
+          <p:cNvPr id="8" name="Title 1">
             <a:extLst>
               <a:ext uri="{FF2B5EF4-FFF2-40B4-BE49-F238E27FC236}">
-                <a16:creationId xmlns:a16="http://schemas.microsoft.com/office/drawing/2014/main" id="{76A47BE7-C968-4C6E-B64E-28E7C87E7F1B}"/>
+                <a16:creationId xmlns:a16="http://schemas.microsoft.com/office/drawing/2014/main" id="{056C5B34-CA34-F34D-86F2-F9829AEE4602}"/>
               </a:ext>
             </a:extLst>
           </p:cNvPr>
@@ -4854,7 +5314,7 @@
           <p:cNvPr id="5" name="Content Placeholder 4">
             <a:extLst>
               <a:ext uri="{FF2B5EF4-FFF2-40B4-BE49-F238E27FC236}">
-                <a16:creationId xmlns:a16="http://schemas.microsoft.com/office/drawing/2014/main" id="{860EB01D-266E-0243-A4B4-0268ADA7CAC4}"/>
+                <a16:creationId xmlns:a16="http://schemas.microsoft.com/office/drawing/2014/main" id="{7439F800-7822-3A47-8CFB-E9EB1A30FF0D}"/>
               </a:ext>
             </a:extLst>
           </p:cNvPr>
@@ -4873,15 +5333,15 @@
         </p:blipFill>
         <p:spPr>
           <a:xfrm>
-            <a:off x="518984" y="1037968"/>
-            <a:ext cx="9700054" cy="5542064"/>
+            <a:off x="261882" y="1175156"/>
+            <a:ext cx="6115992" cy="4077328"/>
           </a:xfrm>
         </p:spPr>
       </p:pic>
     </p:spTree>
     <p:extLst>
       <p:ext uri="{BB962C8B-B14F-4D97-AF65-F5344CB8AC3E}">
-        <p14:creationId xmlns:p14="http://schemas.microsoft.com/office/powerpoint/2010/main" val="796429050"/>
+        <p14:creationId xmlns:p14="http://schemas.microsoft.com/office/powerpoint/2010/main" val="1691755461"/>
       </p:ext>
     </p:extLst>
   </p:cSld>
@@ -4891,9 +5351,19 @@
 </p:sld>
 </file>
 
-<file path=ppt/slides/slide19.xml><?xml version="1.0" encoding="utf-8"?>
-<p:sld xmlns:a="http://schemas.openxmlformats.org/drawingml/2006/main" xmlns:r="http://schemas.openxmlformats.org/officeDocument/2006/relationships" xmlns:p="http://schemas.openxmlformats.org/presentationml/2006/main">
+<file path=ppt/slides/slide21.xml><?xml version="1.0" encoding="utf-8"?>
+<p:sld xmlns:a="http://schemas.openxmlformats.org/drawingml/2006/main" xmlns:r="http://schemas.openxmlformats.org/officeDocument/2006/relationships" xmlns:p="http://schemas.openxmlformats.org/presentationml/2006/main" showMasterSp="0">
   <p:cSld>
+    <p:bg>
+      <p:bgPr>
+        <a:solidFill>
+          <a:schemeClr val="bg2">
+            <a:alpha val="4000"/>
+          </a:schemeClr>
+        </a:solidFill>
+        <a:effectLst/>
+      </p:bgPr>
+    </p:bg>
     <p:spTree>
       <p:nvGrpSpPr>
         <p:cNvPr id="1" name=""/>
@@ -4908,41 +5378,45 @@
           <a:chExt cx="0" cy="0"/>
         </a:xfrm>
       </p:grpSpPr>
-      <p:pic>
-        <p:nvPicPr>
-          <p:cNvPr id="5" name="Content Placeholder 4">
+      <p:sp>
+        <p:nvSpPr>
+          <p:cNvPr id="2" name="Title 1">
             <a:extLst>
               <a:ext uri="{FF2B5EF4-FFF2-40B4-BE49-F238E27FC236}">
-                <a16:creationId xmlns:a16="http://schemas.microsoft.com/office/drawing/2014/main" id="{94D9E8F3-492A-7D4C-B004-5C27B1F91C12}"/>
+                <a16:creationId xmlns:a16="http://schemas.microsoft.com/office/drawing/2014/main" id="{76A47BE7-C968-4C6E-B64E-28E7C87E7F1B}"/>
               </a:ext>
             </a:extLst>
           </p:cNvPr>
-          <p:cNvPicPr>
-            <a:picLocks noGrp="1" noChangeAspect="1"/>
-          </p:cNvPicPr>
-          <p:nvPr>
-            <p:ph idx="1"/>
-          </p:nvPr>
-        </p:nvPicPr>
-        <p:blipFill>
-          <a:blip r:embed="rId2"/>
-          <a:stretch>
-            <a:fillRect/>
-          </a:stretch>
-        </p:blipFill>
-        <p:spPr>
-          <a:xfrm>
-            <a:off x="569055" y="1016031"/>
-            <a:ext cx="8426664" cy="5617776"/>
-          </a:xfrm>
-        </p:spPr>
-      </p:pic>
-      <p:sp>
-        <p:nvSpPr>
-          <p:cNvPr id="6" name="Title 1">
+          <p:cNvSpPr>
+            <a:spLocks noGrp="1"/>
+          </p:cNvSpPr>
+          <p:nvPr>
+            <p:ph type="title"/>
+          </p:nvPr>
+        </p:nvSpPr>
+        <p:spPr>
+          <a:xfrm>
+            <a:off x="1343232" y="290477"/>
+            <a:ext cx="9765964" cy="1280890"/>
+          </a:xfrm>
+        </p:spPr>
+        <p:txBody>
+          <a:bodyPr/>
+          <a:lstStyle/>
+          <a:p>
+            <a:r>
+              <a:rPr lang="en-US" dirty="0"/>
+              <a:t>Conclusions</a:t>
+            </a:r>
+          </a:p>
+        </p:txBody>
+      </p:sp>
+      <p:sp>
+        <p:nvSpPr>
+          <p:cNvPr id="3" name="Content Placeholder 2">
             <a:extLst>
               <a:ext uri="{FF2B5EF4-FFF2-40B4-BE49-F238E27FC236}">
-                <a16:creationId xmlns:a16="http://schemas.microsoft.com/office/drawing/2014/main" id="{C8C4C8C6-BF92-594C-977C-77D44E77D074}"/>
+                <a16:creationId xmlns:a16="http://schemas.microsoft.com/office/drawing/2014/main" id="{68EEF821-166E-43EC-9FC5-16D24568EFAB}"/>
               </a:ext>
             </a:extLst>
           </p:cNvPr>
@@ -4950,30 +5424,49 @@
             <a:spLocks noGrp="1"/>
           </p:cNvSpPr>
           <p:nvPr>
-            <p:ph type="title"/>
-          </p:nvPr>
-        </p:nvSpPr>
-        <p:spPr>
-          <a:xfrm>
-            <a:off x="261882" y="105474"/>
-            <a:ext cx="4841459" cy="759498"/>
+            <p:ph idx="1"/>
+          </p:nvPr>
+        </p:nvSpPr>
+        <p:spPr>
+          <a:xfrm>
+            <a:off x="1249251" y="1705233"/>
+            <a:ext cx="10255361" cy="4205990"/>
           </a:xfrm>
         </p:spPr>
         <p:txBody>
           <a:bodyPr/>
           <a:lstStyle/>
           <a:p>
+            <a:pPr algn="just"/>
             <a:r>
               <a:rPr lang="en-US" dirty="0"/>
-              <a:t>Results</a:t>
-            </a:r>
+              <a:t>1. </a:t>
+            </a:r>
+          </a:p>
+          <a:p>
+            <a:pPr algn="just"/>
+            <a:r>
+              <a:rPr lang="en-US" dirty="0"/>
+              <a:t>2. </a:t>
+            </a:r>
+          </a:p>
+          <a:p>
+            <a:pPr algn="just"/>
+            <a:r>
+              <a:rPr lang="en-US" dirty="0"/>
+              <a:t>3. </a:t>
+            </a:r>
+          </a:p>
+          <a:p>
+            <a:pPr algn="just"/>
+            <a:endParaRPr lang="en-US" dirty="0"/>
           </a:p>
         </p:txBody>
       </p:sp>
     </p:spTree>
     <p:extLst>
       <p:ext uri="{BB962C8B-B14F-4D97-AF65-F5344CB8AC3E}">
-        <p14:creationId xmlns:p14="http://schemas.microsoft.com/office/powerpoint/2010/main" val="602088440"/>
+        <p14:creationId xmlns:p14="http://schemas.microsoft.com/office/powerpoint/2010/main" val="932847047"/>
       </p:ext>
     </p:extLst>
   </p:cSld>
@@ -4983,9 +5476,19 @@
 </p:sld>
 </file>
 
-<file path=ppt/slides/slide2.xml><?xml version="1.0" encoding="utf-8"?>
-<p:sld xmlns:a="http://schemas.openxmlformats.org/drawingml/2006/main" xmlns:r="http://schemas.openxmlformats.org/officeDocument/2006/relationships" xmlns:p="http://schemas.openxmlformats.org/presentationml/2006/main">
+<file path=ppt/slides/slide22.xml><?xml version="1.0" encoding="utf-8"?>
+<p:sld xmlns:a="http://schemas.openxmlformats.org/drawingml/2006/main" xmlns:r="http://schemas.openxmlformats.org/officeDocument/2006/relationships" xmlns:p="http://schemas.openxmlformats.org/presentationml/2006/main" showMasterSp="0">
   <p:cSld>
+    <p:bg>
+      <p:bgPr>
+        <a:solidFill>
+          <a:schemeClr val="bg2">
+            <a:alpha val="4000"/>
+          </a:schemeClr>
+        </a:solidFill>
+        <a:effectLst/>
+      </p:bgPr>
+    </p:bg>
     <p:spTree>
       <p:nvGrpSpPr>
         <p:cNvPr id="1" name=""/>
@@ -5005,7 +5508,7 @@
           <p:cNvPr id="2" name="Title 1">
             <a:extLst>
               <a:ext uri="{FF2B5EF4-FFF2-40B4-BE49-F238E27FC236}">
-                <a16:creationId xmlns:a16="http://schemas.microsoft.com/office/drawing/2014/main" id="{CE142BD7-5B74-42AC-B344-097090A2BE04}"/>
+                <a16:creationId xmlns:a16="http://schemas.microsoft.com/office/drawing/2014/main" id="{76A47BE7-C968-4C6E-B64E-28E7C87E7F1B}"/>
               </a:ext>
             </a:extLst>
           </p:cNvPr>
@@ -5018,19 +5521,21 @@
         </p:nvSpPr>
         <p:spPr>
           <a:xfrm>
-            <a:off x="1536858" y="366532"/>
-            <a:ext cx="8911687" cy="728701"/>
-          </a:xfrm>
-        </p:spPr>
-        <p:txBody>
-          <a:bodyPr>
-            <a:normAutofit fontScale="90000"/>
-          </a:bodyPr>
-          <a:lstStyle/>
-          <a:p>
-            <a:r>
-              <a:rPr lang="en-US" dirty="0"/>
-              <a:t>Project Requirements</a:t>
+            <a:off x="1343232" y="290477"/>
+            <a:ext cx="9765964" cy="1280890"/>
+          </a:xfrm>
+        </p:spPr>
+        <p:txBody>
+          <a:bodyPr/>
+          <a:lstStyle/>
+          <a:p>
+            <a:r>
+              <a:rPr lang="en-US" dirty="0">
+                <a:solidFill>
+                  <a:schemeClr val="tx1"/>
+                </a:solidFill>
+              </a:rPr>
+              <a:t>Future Work/Assignments</a:t>
             </a:r>
           </a:p>
         </p:txBody>
@@ -5040,7 +5545,7 @@
           <p:cNvPr id="3" name="Content Placeholder 2">
             <a:extLst>
               <a:ext uri="{FF2B5EF4-FFF2-40B4-BE49-F238E27FC236}">
-                <a16:creationId xmlns:a16="http://schemas.microsoft.com/office/drawing/2014/main" id="{2C60C703-4583-4865-9A82-536B44D243F5}"/>
+                <a16:creationId xmlns:a16="http://schemas.microsoft.com/office/drawing/2014/main" id="{68EEF821-166E-43EC-9FC5-16D24568EFAB}"/>
               </a:ext>
             </a:extLst>
           </p:cNvPr>
@@ -5053,92 +5558,44 @@
         </p:nvSpPr>
         <p:spPr>
           <a:xfrm>
-            <a:off x="243655" y="1221057"/>
-            <a:ext cx="11285671" cy="5229170"/>
-          </a:xfrm>
-        </p:spPr>
-        <p:txBody>
-          <a:bodyPr>
-            <a:noAutofit/>
-          </a:bodyPr>
-          <a:lstStyle/>
-          <a:p>
-            <a:r>
-              <a:rPr lang="en-US" sz="2000" dirty="0"/>
-              <a:t>The technical requirements for Project 1 are as follows.</a:t>
-            </a:r>
-          </a:p>
-          <a:p>
-            <a:pPr lvl="1"/>
-            <a:r>
-              <a:rPr lang="en-US" sz="2000" dirty="0"/>
-              <a:t>Use Pandas to clean and format your data set(s)</a:t>
-            </a:r>
-          </a:p>
-          <a:p>
-            <a:pPr lvl="1"/>
-            <a:r>
-              <a:rPr lang="en-US" sz="2000" dirty="0"/>
-              <a:t>Create a </a:t>
-            </a:r>
-            <a:r>
-              <a:rPr lang="en-US" sz="2000" dirty="0" err="1"/>
-              <a:t>Jupyter</a:t>
-            </a:r>
-            <a:r>
-              <a:rPr lang="en-US" sz="2000" dirty="0"/>
-              <a:t> Notebook describing the data exploration and cleanup process</a:t>
-            </a:r>
-          </a:p>
-          <a:p>
-            <a:pPr lvl="1"/>
-            <a:r>
-              <a:rPr lang="en-US" sz="2000" dirty="0"/>
-              <a:t>Create a </a:t>
-            </a:r>
-            <a:r>
-              <a:rPr lang="en-US" sz="2000" dirty="0" err="1"/>
-              <a:t>Jupyter</a:t>
-            </a:r>
-            <a:r>
-              <a:rPr lang="en-US" sz="2000" dirty="0"/>
-              <a:t> Notebook illustrating the final data analysis</a:t>
-            </a:r>
-          </a:p>
-          <a:p>
-            <a:pPr lvl="1"/>
-            <a:r>
-              <a:rPr lang="en-US" sz="2000" dirty="0"/>
-              <a:t>Use Matplotlib to create a total of 6-8 visualizations of your data (ideally, at least 2 per "question" you ask of your data)</a:t>
-            </a:r>
-          </a:p>
-          <a:p>
-            <a:pPr lvl="1"/>
-            <a:r>
-              <a:rPr lang="en-US" sz="2000" dirty="0"/>
-              <a:t>Save PNG images of your visualizations to distribute to the class and instructional team, and for inclusion in your presentation</a:t>
-            </a:r>
-          </a:p>
-          <a:p>
-            <a:pPr lvl="1"/>
-            <a:r>
-              <a:rPr lang="en-US" sz="2000" dirty="0"/>
-              <a:t>Optionally, use at least one API, if you can find an API with data pertinent to your primary research questions</a:t>
-            </a:r>
-          </a:p>
-          <a:p>
-            <a:pPr lvl="1"/>
-            <a:r>
-              <a:rPr lang="en-US" sz="2000" dirty="0"/>
-              <a:t>Create a write-up summarizing your major findings. This should include a heading for each "question" you asked of your data, and under each heading, a short description of what you found and any relevant plots.</a:t>
-            </a:r>
+            <a:off x="1249251" y="1705233"/>
+            <a:ext cx="10255361" cy="4205990"/>
+          </a:xfrm>
+        </p:spPr>
+        <p:txBody>
+          <a:bodyPr/>
+          <a:lstStyle/>
+          <a:p>
+            <a:pPr algn="just"/>
+            <a:r>
+              <a:rPr lang="en-US" dirty="0"/>
+              <a:t>1. … but property crime decreased in most counties. </a:t>
+            </a:r>
+          </a:p>
+          <a:p>
+            <a:pPr algn="just"/>
+            <a:r>
+              <a:rPr lang="en-US" dirty="0"/>
+              <a:t>2. </a:t>
+            </a:r>
+          </a:p>
+          <a:p>
+            <a:pPr algn="just"/>
+            <a:r>
+              <a:rPr lang="en-US" dirty="0"/>
+              <a:t>3. </a:t>
+            </a:r>
+          </a:p>
+          <a:p>
+            <a:pPr algn="just"/>
+            <a:endParaRPr lang="en-US" dirty="0"/>
           </a:p>
         </p:txBody>
       </p:sp>
     </p:spTree>
     <p:extLst>
       <p:ext uri="{BB962C8B-B14F-4D97-AF65-F5344CB8AC3E}">
-        <p14:creationId xmlns:p14="http://schemas.microsoft.com/office/powerpoint/2010/main" val="676392575"/>
+        <p14:creationId xmlns:p14="http://schemas.microsoft.com/office/powerpoint/2010/main" val="1610966595"/>
       </p:ext>
     </p:extLst>
   </p:cSld>
@@ -5148,9 +5605,19 @@
 </p:sld>
 </file>
 
-<file path=ppt/slides/slide20.xml><?xml version="1.0" encoding="utf-8"?>
-<p:sld xmlns:a="http://schemas.openxmlformats.org/drawingml/2006/main" xmlns:r="http://schemas.openxmlformats.org/officeDocument/2006/relationships" xmlns:p="http://schemas.openxmlformats.org/presentationml/2006/main">
+<file path=ppt/slides/slide23.xml><?xml version="1.0" encoding="utf-8"?>
+<p:sld xmlns:a="http://schemas.openxmlformats.org/drawingml/2006/main" xmlns:r="http://schemas.openxmlformats.org/officeDocument/2006/relationships" xmlns:p="http://schemas.openxmlformats.org/presentationml/2006/main" showMasterSp="0">
   <p:cSld>
+    <p:bg>
+      <p:bgPr>
+        <a:solidFill>
+          <a:schemeClr val="bg2">
+            <a:alpha val="4000"/>
+          </a:schemeClr>
+        </a:solidFill>
+        <a:effectLst/>
+      </p:bgPr>
+    </p:bg>
     <p:spTree>
       <p:nvGrpSpPr>
         <p:cNvPr id="1" name=""/>
@@ -5165,41 +5632,40 @@
           <a:chExt cx="0" cy="0"/>
         </a:xfrm>
       </p:grpSpPr>
-      <p:pic>
-        <p:nvPicPr>
-          <p:cNvPr id="5" name="Content Placeholder 4">
+      <p:sp>
+        <p:nvSpPr>
+          <p:cNvPr id="2" name="Title 1">
             <a:extLst>
               <a:ext uri="{FF2B5EF4-FFF2-40B4-BE49-F238E27FC236}">
-                <a16:creationId xmlns:a16="http://schemas.microsoft.com/office/drawing/2014/main" id="{7439F800-7822-3A47-8CFB-E9EB1A30FF0D}"/>
+                <a16:creationId xmlns:a16="http://schemas.microsoft.com/office/drawing/2014/main" id="{3BE2B5BE-8818-1D40-AA3D-4804BA126112}"/>
               </a:ext>
             </a:extLst>
           </p:cNvPr>
-          <p:cNvPicPr>
-            <a:picLocks noGrp="1" noChangeAspect="1"/>
-          </p:cNvPicPr>
-          <p:nvPr>
-            <p:ph idx="1"/>
-          </p:nvPr>
-        </p:nvPicPr>
-        <p:blipFill>
-          <a:blip r:embed="rId2"/>
-          <a:stretch>
-            <a:fillRect/>
-          </a:stretch>
-        </p:blipFill>
-        <p:spPr>
-          <a:xfrm>
-            <a:off x="261881" y="1143258"/>
-            <a:ext cx="7819437" cy="5212959"/>
-          </a:xfrm>
-        </p:spPr>
-      </p:pic>
-      <p:sp>
-        <p:nvSpPr>
-          <p:cNvPr id="8" name="Title 1">
+          <p:cNvSpPr>
+            <a:spLocks noGrp="1"/>
+          </p:cNvSpPr>
+          <p:nvPr>
+            <p:ph type="title"/>
+          </p:nvPr>
+        </p:nvSpPr>
+        <p:spPr/>
+        <p:txBody>
+          <a:bodyPr/>
+          <a:lstStyle/>
+          <a:p>
+            <a:r>
+              <a:rPr lang="en-US" dirty="0"/>
+              <a:t>References</a:t>
+            </a:r>
+          </a:p>
+        </p:txBody>
+      </p:sp>
+      <p:sp>
+        <p:nvSpPr>
+          <p:cNvPr id="3" name="Content Placeholder 2">
             <a:extLst>
               <a:ext uri="{FF2B5EF4-FFF2-40B4-BE49-F238E27FC236}">
-                <a16:creationId xmlns:a16="http://schemas.microsoft.com/office/drawing/2014/main" id="{056C5B34-CA34-F34D-86F2-F9829AEE4602}"/>
+                <a16:creationId xmlns:a16="http://schemas.microsoft.com/office/drawing/2014/main" id="{9EBE3755-FC78-F441-92C0-9F6CC669855A}"/>
               </a:ext>
             </a:extLst>
           </p:cNvPr>
@@ -5207,13 +5673,13 @@
             <a:spLocks noGrp="1"/>
           </p:cNvSpPr>
           <p:nvPr>
-            <p:ph type="title"/>
-          </p:nvPr>
-        </p:nvSpPr>
-        <p:spPr>
-          <a:xfrm>
-            <a:off x="261882" y="105474"/>
-            <a:ext cx="4841459" cy="759498"/>
+            <p:ph idx="1"/>
+          </p:nvPr>
+        </p:nvSpPr>
+        <p:spPr>
+          <a:xfrm>
+            <a:off x="2231136" y="2153412"/>
+            <a:ext cx="7729728" cy="3586615"/>
           </a:xfrm>
         </p:spPr>
         <p:txBody>
@@ -5222,7 +5688,50 @@
           <a:p>
             <a:r>
               <a:rPr lang="en-US" dirty="0"/>
-              <a:t>Results</a:t>
+              <a:t>1. https://</a:t>
+            </a:r>
+            <a:r>
+              <a:rPr lang="en-US" dirty="0" err="1"/>
+              <a:t>blog.dominodatalab.com</a:t>
+            </a:r>
+            <a:r>
+              <a:rPr lang="en-US" dirty="0"/>
+              <a:t>/creating-interactive-crime-maps-with-folium/</a:t>
+            </a:r>
+          </a:p>
+        </p:txBody>
+      </p:sp>
+      <p:sp>
+        <p:nvSpPr>
+          <p:cNvPr id="4" name="TextBox 3">
+            <a:extLst>
+              <a:ext uri="{FF2B5EF4-FFF2-40B4-BE49-F238E27FC236}">
+                <a16:creationId xmlns:a16="http://schemas.microsoft.com/office/drawing/2014/main" id="{841B5470-323E-1045-BAAC-4BA99DB7CE23}"/>
+              </a:ext>
+            </a:extLst>
+          </p:cNvPr>
+          <p:cNvSpPr txBox="1"/>
+          <p:nvPr/>
+        </p:nvSpPr>
+        <p:spPr>
+          <a:xfrm>
+            <a:off x="3427881" y="5903309"/>
+            <a:ext cx="4036174" cy="461665"/>
+          </a:xfrm>
+          <a:prstGeom prst="rect">
+            <a:avLst/>
+          </a:prstGeom>
+          <a:noFill/>
+        </p:spPr>
+        <p:txBody>
+          <a:bodyPr wrap="square" rtlCol="0">
+            <a:spAutoFit/>
+          </a:bodyPr>
+          <a:lstStyle/>
+          <a:p>
+            <a:r>
+              <a:rPr lang="en-US" sz="2400" dirty="0"/>
+              <a:t>Thanks to Jake and Chris!</a:t>
             </a:r>
           </a:p>
         </p:txBody>
@@ -5230,7 +5739,7 @@
     </p:spTree>
     <p:extLst>
       <p:ext uri="{BB962C8B-B14F-4D97-AF65-F5344CB8AC3E}">
-        <p14:creationId xmlns:p14="http://schemas.microsoft.com/office/powerpoint/2010/main" val="1691755461"/>
+        <p14:creationId xmlns:p14="http://schemas.microsoft.com/office/powerpoint/2010/main" val="1846751660"/>
       </p:ext>
     </p:extLst>
   </p:cSld>
@@ -5240,9 +5749,19 @@
 </p:sld>
 </file>
 
-<file path=ppt/slides/slide21.xml><?xml version="1.0" encoding="utf-8"?>
-<p:sld xmlns:a="http://schemas.openxmlformats.org/drawingml/2006/main" xmlns:r="http://schemas.openxmlformats.org/officeDocument/2006/relationships" xmlns:p="http://schemas.openxmlformats.org/presentationml/2006/main">
+<file path=ppt/slides/slide3.xml><?xml version="1.0" encoding="utf-8"?>
+<p:sld xmlns:a="http://schemas.openxmlformats.org/drawingml/2006/main" xmlns:r="http://schemas.openxmlformats.org/officeDocument/2006/relationships" xmlns:p="http://schemas.openxmlformats.org/presentationml/2006/main" showMasterSp="0">
   <p:cSld>
+    <p:bg>
+      <p:bgPr>
+        <a:solidFill>
+          <a:schemeClr val="bg2">
+            <a:alpha val="7000"/>
+          </a:schemeClr>
+        </a:solidFill>
+        <a:effectLst/>
+      </p:bgPr>
+    </p:bg>
     <p:spTree>
       <p:nvGrpSpPr>
         <p:cNvPr id="1" name=""/>
@@ -5262,7 +5781,7 @@
           <p:cNvPr id="2" name="Title 1">
             <a:extLst>
               <a:ext uri="{FF2B5EF4-FFF2-40B4-BE49-F238E27FC236}">
-                <a16:creationId xmlns:a16="http://schemas.microsoft.com/office/drawing/2014/main" id="{6A74D095-0384-4E74-A61F-43B44B852868}"/>
+                <a16:creationId xmlns:a16="http://schemas.microsoft.com/office/drawing/2014/main" id="{76A47BE7-C968-4C6E-B64E-28E7C87E7F1B}"/>
               </a:ext>
             </a:extLst>
           </p:cNvPr>
@@ -5275,29 +5794,104 @@
         </p:nvSpPr>
         <p:spPr>
           <a:xfrm>
-            <a:off x="2066298" y="482779"/>
-            <a:ext cx="7729728" cy="1188720"/>
+            <a:off x="4311514" y="316034"/>
+            <a:ext cx="3974036" cy="463384"/>
           </a:xfrm>
         </p:spPr>
         <p:txBody>
           <a:bodyPr>
-            <a:normAutofit/>
+            <a:normAutofit fontScale="90000"/>
           </a:bodyPr>
           <a:lstStyle/>
           <a:p>
             <a:r>
-              <a:rPr lang="en-US" sz="4000" dirty="0"/>
-              <a:t>Flow of presentation</a:t>
-            </a:r>
-          </a:p>
-        </p:txBody>
-      </p:sp>
-      <p:sp>
-        <p:nvSpPr>
-          <p:cNvPr id="6" name="TextBox 5">
+              <a:rPr lang="en-US" dirty="0"/>
+              <a:t>Motivation</a:t>
+            </a:r>
+          </a:p>
+        </p:txBody>
+      </p:sp>
+      <p:sp>
+        <p:nvSpPr>
+          <p:cNvPr id="3" name="Content Placeholder 2">
             <a:extLst>
               <a:ext uri="{FF2B5EF4-FFF2-40B4-BE49-F238E27FC236}">
-                <a16:creationId xmlns:a16="http://schemas.microsoft.com/office/drawing/2014/main" id="{AD9DB1C8-1735-7749-A35C-AF4B22EC4708}"/>
+                <a16:creationId xmlns:a16="http://schemas.microsoft.com/office/drawing/2014/main" id="{68EEF821-166E-43EC-9FC5-16D24568EFAB}"/>
+              </a:ext>
+            </a:extLst>
+          </p:cNvPr>
+          <p:cNvSpPr>
+            <a:spLocks noGrp="1"/>
+          </p:cNvSpPr>
+          <p:nvPr>
+            <p:ph idx="1"/>
+          </p:nvPr>
+        </p:nvSpPr>
+        <p:spPr>
+          <a:xfrm>
+            <a:off x="132348" y="950496"/>
+            <a:ext cx="4271210" cy="5179667"/>
+          </a:xfrm>
+        </p:spPr>
+        <p:txBody>
+          <a:bodyPr>
+            <a:noAutofit/>
+          </a:bodyPr>
+          <a:lstStyle/>
+          <a:p>
+            <a:pPr fontAlgn="base"/>
+            <a:r>
+              <a:rPr lang="en-US" sz="2100" u="sng" dirty="0"/>
+              <a:t>Crime Trends in California(2016)*:</a:t>
+            </a:r>
+          </a:p>
+          <a:p>
+            <a:pPr lvl="1" fontAlgn="base"/>
+            <a:r>
+              <a:rPr lang="en-US" sz="2100" dirty="0"/>
+              <a:t>California’s violent crime rate rose in 2016—but it remains historically low. </a:t>
+            </a:r>
+          </a:p>
+          <a:p>
+            <a:pPr lvl="1" fontAlgn="base"/>
+            <a:r>
+              <a:rPr lang="en-US" sz="2100" dirty="0"/>
+              <a:t>The statewide property crime rate decreased in 2016. </a:t>
+            </a:r>
+          </a:p>
+          <a:p>
+            <a:pPr lvl="1" fontAlgn="base"/>
+            <a:r>
+              <a:rPr lang="en-US" sz="2100" dirty="0"/>
+              <a:t>Crime rates vary dramatically by region and category. </a:t>
+            </a:r>
+          </a:p>
+          <a:p>
+            <a:pPr lvl="1" fontAlgn="base"/>
+            <a:r>
+              <a:rPr lang="en-US" sz="2100" dirty="0">
+                <a:highlight>
+                  <a:srgbClr val="FFFF00"/>
+                </a:highlight>
+              </a:rPr>
+              <a:t>Violent crime increased in a majority of counties … </a:t>
+            </a:r>
+          </a:p>
+          <a:p>
+            <a:pPr lvl="1" fontAlgn="base"/>
+            <a:r>
+              <a:rPr lang="en-US" sz="2100" dirty="0"/>
+              <a:t>… but property crime decreased in most counties. </a:t>
+            </a:r>
+          </a:p>
+        </p:txBody>
+      </p:sp>
+      <p:sp>
+        <p:nvSpPr>
+          <p:cNvPr id="4" name="TextBox 3">
+            <a:extLst>
+              <a:ext uri="{FF2B5EF4-FFF2-40B4-BE49-F238E27FC236}">
+                <a16:creationId xmlns:a16="http://schemas.microsoft.com/office/drawing/2014/main" id="{4E4DFEC3-4E16-B547-8C80-3E681B8EDC35}"/>
               </a:ext>
             </a:extLst>
           </p:cNvPr>
@@ -5306,8 +5900,8 @@
         </p:nvSpPr>
         <p:spPr>
           <a:xfrm>
-            <a:off x="1220191" y="1883572"/>
-            <a:ext cx="9594937" cy="3539430"/>
+            <a:off x="986590" y="5791609"/>
+            <a:ext cx="10623884" cy="338554"/>
           </a:xfrm>
           <a:prstGeom prst="rect">
             <a:avLst/>
@@ -5320,78 +5914,74 @@
           </a:bodyPr>
           <a:lstStyle/>
           <a:p>
-            <a:pPr marL="342900" indent="-342900">
-              <a:buAutoNum type="arabicPeriod"/>
-            </a:pPr>
-            <a:r>
-              <a:rPr lang="en-US" sz="3200" strike="sngStrike" dirty="0"/>
-              <a:t>Questions</a:t>
-            </a:r>
-          </a:p>
-          <a:p>
-            <a:pPr marL="342900" indent="-342900">
-              <a:buAutoNum type="arabicPeriod"/>
-            </a:pPr>
-            <a:r>
-              <a:rPr lang="en-US" sz="3200" strike="sngStrike" dirty="0"/>
-              <a:t>Data Sources</a:t>
-            </a:r>
-          </a:p>
-          <a:p>
-            <a:pPr marL="342900" indent="-342900">
-              <a:buAutoNum type="arabicPeriod"/>
-            </a:pPr>
-            <a:r>
-              <a:rPr lang="en-US" sz="3200" strike="sngStrike" dirty="0"/>
-              <a:t>Data Cleaning &amp; Technical Applications</a:t>
-            </a:r>
-          </a:p>
-          <a:p>
-            <a:pPr marL="342900" indent="-342900">
-              <a:buAutoNum type="arabicPeriod"/>
-            </a:pPr>
-            <a:r>
-              <a:rPr lang="en-US" sz="3200" strike="sngStrike" dirty="0"/>
-              <a:t>Data Description</a:t>
-            </a:r>
-          </a:p>
-          <a:p>
-            <a:pPr marL="342900" indent="-342900">
-              <a:buAutoNum type="arabicPeriod"/>
-            </a:pPr>
-            <a:r>
-              <a:rPr lang="en-US" sz="3200" strike="sngStrike" dirty="0"/>
-              <a:t>Results</a:t>
-            </a:r>
-          </a:p>
-          <a:p>
-            <a:pPr marL="342900" indent="-342900">
-              <a:buAutoNum type="arabicPeriod"/>
-            </a:pPr>
-            <a:r>
-              <a:rPr lang="en-US" sz="3200" dirty="0">
-                <a:solidFill>
-                  <a:srgbClr val="FF0000"/>
-                </a:solidFill>
+            <a:r>
+              <a:rPr lang="en-US" sz="1600" dirty="0"/>
+              <a:t>*</a:t>
+            </a:r>
+            <a:r>
+              <a:rPr lang="en-US" sz="1600" i="1" dirty="0"/>
+              <a:t>Public Policy Institute of California publication in November</a:t>
+            </a:r>
+            <a:r>
+              <a:rPr lang="en-US" sz="1600" i="1" cap="all" dirty="0"/>
+              <a:t> 2017</a:t>
+            </a:r>
+            <a:r>
+              <a:rPr lang="en-US" sz="1600" i="1" dirty="0"/>
+              <a:t>: </a:t>
+            </a:r>
+            <a:r>
+              <a:rPr lang="en-US" sz="1600" i="1" dirty="0">
+                <a:hlinkClick r:id="rId2"/>
               </a:rPr>
-              <a:t>Conclusions</a:t>
-            </a:r>
-          </a:p>
-          <a:p>
-            <a:pPr marL="342900" indent="-342900">
-              <a:buAutoNum type="arabicPeriod"/>
-            </a:pPr>
-            <a:r>
-              <a:rPr lang="en-US" sz="3200" dirty="0"/>
-              <a:t>Future Work/Assignments</a:t>
-            </a:r>
-          </a:p>
-        </p:txBody>
-      </p:sp>
+              <a:t>http://www.ppic.org/publication/crime-trends-in-california</a:t>
+            </a:r>
+            <a:r>
+              <a:rPr lang="en-US" sz="1600" dirty="0">
+                <a:hlinkClick r:id="rId2"/>
+              </a:rPr>
+              <a:t>/</a:t>
+            </a:r>
+            <a:endParaRPr lang="en-US" sz="1600" dirty="0"/>
+          </a:p>
+        </p:txBody>
+      </p:sp>
+      <p:pic>
+        <p:nvPicPr>
+          <p:cNvPr id="10" name="Picture 9">
+            <a:extLst>
+              <a:ext uri="{FF2B5EF4-FFF2-40B4-BE49-F238E27FC236}">
+                <a16:creationId xmlns:a16="http://schemas.microsoft.com/office/drawing/2014/main" id="{FFE1970B-280A-5B47-AFCD-68327AF1B49F}"/>
+              </a:ext>
+            </a:extLst>
+          </p:cNvPr>
+          <p:cNvPicPr>
+            <a:picLocks noChangeAspect="1"/>
+          </p:cNvPicPr>
+          <p:nvPr/>
+        </p:nvPicPr>
+        <p:blipFill>
+          <a:blip r:embed="rId3"/>
+          <a:stretch>
+            <a:fillRect/>
+          </a:stretch>
+        </p:blipFill>
+        <p:spPr>
+          <a:xfrm>
+            <a:off x="4541580" y="1450487"/>
+            <a:ext cx="7409433" cy="3535581"/>
+          </a:xfrm>
+          <a:prstGeom prst="rect">
+            <a:avLst/>
+          </a:prstGeom>
+          <a:noFill/>
+          <a:effectLst/>
+        </p:spPr>
+      </p:pic>
     </p:spTree>
     <p:extLst>
       <p:ext uri="{BB962C8B-B14F-4D97-AF65-F5344CB8AC3E}">
-        <p14:creationId xmlns:p14="http://schemas.microsoft.com/office/powerpoint/2010/main" val="1864573855"/>
+        <p14:creationId xmlns:p14="http://schemas.microsoft.com/office/powerpoint/2010/main" val="2096109920"/>
       </p:ext>
     </p:extLst>
   </p:cSld>
@@ -5401,9 +5991,19 @@
 </p:sld>
 </file>
 
-<file path=ppt/slides/slide22.xml><?xml version="1.0" encoding="utf-8"?>
-<p:sld xmlns:a="http://schemas.openxmlformats.org/drawingml/2006/main" xmlns:r="http://schemas.openxmlformats.org/officeDocument/2006/relationships" xmlns:p="http://schemas.openxmlformats.org/presentationml/2006/main">
+<file path=ppt/slides/slide4.xml><?xml version="1.0" encoding="utf-8"?>
+<p:sld xmlns:a="http://schemas.openxmlformats.org/drawingml/2006/main" xmlns:r="http://schemas.openxmlformats.org/officeDocument/2006/relationships" xmlns:p="http://schemas.openxmlformats.org/presentationml/2006/main" showMasterSp="0">
   <p:cSld>
+    <p:bg>
+      <p:bgPr>
+        <a:solidFill>
+          <a:schemeClr val="bg2">
+            <a:alpha val="0"/>
+          </a:schemeClr>
+        </a:solidFill>
+        <a:effectLst/>
+      </p:bgPr>
+    </p:bg>
     <p:spTree>
       <p:nvGrpSpPr>
         <p:cNvPr id="1" name=""/>
@@ -5420,10 +6020,10 @@
       </p:grpSpPr>
       <p:sp>
         <p:nvSpPr>
-          <p:cNvPr id="2" name="Title 1">
+          <p:cNvPr id="4" name="Title 1">
             <a:extLst>
               <a:ext uri="{FF2B5EF4-FFF2-40B4-BE49-F238E27FC236}">
-                <a16:creationId xmlns:a16="http://schemas.microsoft.com/office/drawing/2014/main" id="{76A47BE7-C968-4C6E-B64E-28E7C87E7F1B}"/>
+                <a16:creationId xmlns:a16="http://schemas.microsoft.com/office/drawing/2014/main" id="{25A5A442-2A72-444E-BE0B-90CB6390A084}"/>
               </a:ext>
             </a:extLst>
           </p:cNvPr>
@@ -5436,17 +6036,19 @@
         </p:nvSpPr>
         <p:spPr>
           <a:xfrm>
-            <a:off x="1343232" y="290477"/>
-            <a:ext cx="9765964" cy="1280890"/>
-          </a:xfrm>
-        </p:spPr>
-        <p:txBody>
-          <a:bodyPr/>
+            <a:off x="4171589" y="419304"/>
+            <a:ext cx="3375580" cy="535157"/>
+          </a:xfrm>
+        </p:spPr>
+        <p:txBody>
+          <a:bodyPr>
+            <a:noAutofit/>
+          </a:bodyPr>
           <a:lstStyle/>
           <a:p>
             <a:r>
               <a:rPr lang="en-US" dirty="0"/>
-              <a:t>Conclusions</a:t>
+              <a:t>Questions</a:t>
             </a:r>
           </a:p>
         </p:txBody>
@@ -5456,7 +6058,7 @@
           <p:cNvPr id="3" name="Content Placeholder 2">
             <a:extLst>
               <a:ext uri="{FF2B5EF4-FFF2-40B4-BE49-F238E27FC236}">
-                <a16:creationId xmlns:a16="http://schemas.microsoft.com/office/drawing/2014/main" id="{68EEF821-166E-43EC-9FC5-16D24568EFAB}"/>
+                <a16:creationId xmlns:a16="http://schemas.microsoft.com/office/drawing/2014/main" id="{A3E51555-681E-CF4D-A4F7-7883E6066756}"/>
               </a:ext>
             </a:extLst>
           </p:cNvPr>
@@ -5469,44 +6071,94 @@
         </p:nvSpPr>
         <p:spPr>
           <a:xfrm>
-            <a:off x="1249251" y="1705233"/>
-            <a:ext cx="10255361" cy="4205990"/>
-          </a:xfrm>
-        </p:spPr>
-        <p:txBody>
-          <a:bodyPr/>
-          <a:lstStyle/>
-          <a:p>
-            <a:pPr algn="just"/>
-            <a:r>
-              <a:rPr lang="en-US" dirty="0"/>
-              <a:t>1. </a:t>
-            </a:r>
-          </a:p>
-          <a:p>
-            <a:pPr algn="just"/>
-            <a:r>
-              <a:rPr lang="en-US" dirty="0"/>
-              <a:t>2. </a:t>
-            </a:r>
-          </a:p>
-          <a:p>
-            <a:pPr algn="just"/>
-            <a:r>
-              <a:rPr lang="en-US" dirty="0"/>
-              <a:t>3. </a:t>
-            </a:r>
-          </a:p>
-          <a:p>
-            <a:pPr algn="just"/>
-            <a:endParaRPr lang="en-US" dirty="0"/>
+            <a:off x="649425" y="1299411"/>
+            <a:ext cx="10801840" cy="5005695"/>
+          </a:xfrm>
+        </p:spPr>
+        <p:txBody>
+          <a:bodyPr>
+            <a:normAutofit/>
+          </a:bodyPr>
+          <a:lstStyle/>
+          <a:p>
+            <a:pPr>
+              <a:lnSpc>
+                <a:spcPct val="150000"/>
+              </a:lnSpc>
+              <a:buFont typeface="Wingdings" pitchFamily="2" charset="2"/>
+              <a:buChar char="à"/>
+            </a:pPr>
+            <a:r>
+              <a:rPr lang="en-US" sz="3200" dirty="0">
+                <a:sym typeface="Wingdings" pitchFamily="2" charset="2"/>
+              </a:rPr>
+              <a:t> Focus on incidence of crime in Los Angeles city:  </a:t>
+            </a:r>
+          </a:p>
+          <a:p>
+            <a:pPr lvl="1">
+              <a:lnSpc>
+                <a:spcPct val="150000"/>
+              </a:lnSpc>
+              <a:buFont typeface="Wingdings" pitchFamily="2" charset="2"/>
+              <a:buChar char="à"/>
+            </a:pPr>
+            <a:r>
+              <a:rPr lang="en-US" sz="3000" dirty="0">
+                <a:sym typeface="Wingdings" pitchFamily="2" charset="2"/>
+              </a:rPr>
+              <a:t>Trends in violent crime rates </a:t>
+            </a:r>
+          </a:p>
+          <a:p>
+            <a:pPr lvl="1">
+              <a:lnSpc>
+                <a:spcPct val="150000"/>
+              </a:lnSpc>
+              <a:buFont typeface="Wingdings" pitchFamily="2" charset="2"/>
+              <a:buChar char="à"/>
+            </a:pPr>
+            <a:r>
+              <a:rPr lang="en-US" sz="3000" dirty="0">
+                <a:sym typeface="Wingdings" pitchFamily="2" charset="2"/>
+              </a:rPr>
+              <a:t>2010 to 2017. </a:t>
+            </a:r>
+          </a:p>
+          <a:p>
+            <a:pPr>
+              <a:lnSpc>
+                <a:spcPct val="150000"/>
+              </a:lnSpc>
+              <a:buFont typeface="Wingdings" pitchFamily="2" charset="2"/>
+              <a:buChar char="à"/>
+            </a:pPr>
+            <a:r>
+              <a:rPr lang="en-US" sz="3200" dirty="0">
+                <a:sym typeface="Wingdings" pitchFamily="2" charset="2"/>
+              </a:rPr>
+              <a:t> More specifically: </a:t>
+            </a:r>
+          </a:p>
+          <a:p>
+            <a:pPr lvl="3">
+              <a:lnSpc>
+                <a:spcPct val="150000"/>
+              </a:lnSpc>
+              <a:buFont typeface="Wingdings" pitchFamily="2" charset="2"/>
+              <a:buChar char="à"/>
+            </a:pPr>
+            <a:r>
+              <a:rPr lang="en-US" sz="3000" dirty="0"/>
+              <a:t> </a:t>
+            </a:r>
           </a:p>
         </p:txBody>
       </p:sp>
     </p:spTree>
     <p:extLst>
       <p:ext uri="{BB962C8B-B14F-4D97-AF65-F5344CB8AC3E}">
-        <p14:creationId xmlns:p14="http://schemas.microsoft.com/office/powerpoint/2010/main" val="932847047"/>
+        <p14:creationId xmlns:p14="http://schemas.microsoft.com/office/powerpoint/2010/main" val="4072275360"/>
       </p:ext>
     </p:extLst>
   </p:cSld>
@@ -5516,9 +6168,19 @@
 </p:sld>
 </file>
 
-<file path=ppt/slides/slide23.xml><?xml version="1.0" encoding="utf-8"?>
-<p:sld xmlns:a="http://schemas.openxmlformats.org/drawingml/2006/main" xmlns:r="http://schemas.openxmlformats.org/officeDocument/2006/relationships" xmlns:p="http://schemas.openxmlformats.org/presentationml/2006/main">
+<file path=ppt/slides/slide5.xml><?xml version="1.0" encoding="utf-8"?>
+<p:sld xmlns:a="http://schemas.openxmlformats.org/drawingml/2006/main" xmlns:r="http://schemas.openxmlformats.org/officeDocument/2006/relationships" xmlns:p="http://schemas.openxmlformats.org/presentationml/2006/main" showMasterSp="0">
   <p:cSld>
+    <p:bg>
+      <p:bgPr>
+        <a:solidFill>
+          <a:schemeClr val="bg2">
+            <a:alpha val="0"/>
+          </a:schemeClr>
+        </a:solidFill>
+        <a:effectLst/>
+      </p:bgPr>
+    </p:bg>
     <p:spTree>
       <p:nvGrpSpPr>
         <p:cNvPr id="1" name=""/>
@@ -5551,19 +6213,19 @@
         </p:nvSpPr>
         <p:spPr>
           <a:xfrm>
-            <a:off x="2066298" y="482779"/>
-            <a:ext cx="7729728" cy="1188720"/>
+            <a:off x="2449136" y="619049"/>
+            <a:ext cx="7353614" cy="563968"/>
           </a:xfrm>
         </p:spPr>
         <p:txBody>
           <a:bodyPr>
-            <a:normAutofit/>
+            <a:normAutofit fontScale="90000"/>
           </a:bodyPr>
           <a:lstStyle/>
           <a:p>
             <a:r>
               <a:rPr lang="en-US" sz="4000" dirty="0"/>
-              <a:t>Flow of presentation</a:t>
+              <a:t>Rest of the presentation</a:t>
             </a:r>
           </a:p>
         </p:txBody>
@@ -5582,8 +6244,8 @@
         </p:nvSpPr>
         <p:spPr>
           <a:xfrm>
-            <a:off x="1220191" y="1883572"/>
-            <a:ext cx="9594937" cy="3539430"/>
+            <a:off x="1339702" y="1637414"/>
+            <a:ext cx="9583710" cy="4437497"/>
           </a:xfrm>
           <a:prstGeom prst="rect">
             <a:avLst/>
@@ -5597,68 +6259,73 @@
           <a:lstStyle/>
           <a:p>
             <a:pPr marL="342900" indent="-342900">
+              <a:lnSpc>
+                <a:spcPct val="150000"/>
+              </a:lnSpc>
               <a:buAutoNum type="arabicPeriod"/>
             </a:pPr>
             <a:r>
-              <a:rPr lang="en-US" sz="3200" strike="sngStrike" dirty="0"/>
-              <a:t>Questions</a:t>
+              <a:rPr lang="en-US" sz="3200" dirty="0"/>
+              <a:t>Data Sources</a:t>
             </a:r>
           </a:p>
           <a:p>
             <a:pPr marL="342900" indent="-342900">
+              <a:lnSpc>
+                <a:spcPct val="150000"/>
+              </a:lnSpc>
               <a:buAutoNum type="arabicPeriod"/>
             </a:pPr>
             <a:r>
-              <a:rPr lang="en-US" sz="3200" strike="sngStrike" dirty="0"/>
-              <a:t>Data Sources</a:t>
+              <a:rPr lang="en-US" sz="3200" dirty="0"/>
+              <a:t>Data Cleaning &amp; Technical Applications</a:t>
             </a:r>
           </a:p>
           <a:p>
             <a:pPr marL="342900" indent="-342900">
+              <a:lnSpc>
+                <a:spcPct val="150000"/>
+              </a:lnSpc>
               <a:buAutoNum type="arabicPeriod"/>
             </a:pPr>
             <a:r>
-              <a:rPr lang="en-US" sz="3200" strike="sngStrike" dirty="0"/>
-              <a:t>Data Cleaning &amp; Technical Applications</a:t>
+              <a:rPr lang="en-US" sz="3200" dirty="0"/>
+              <a:t>Data Description</a:t>
             </a:r>
           </a:p>
           <a:p>
             <a:pPr marL="342900" indent="-342900">
+              <a:lnSpc>
+                <a:spcPct val="150000"/>
+              </a:lnSpc>
               <a:buAutoNum type="arabicPeriod"/>
             </a:pPr>
             <a:r>
-              <a:rPr lang="en-US" sz="3200" strike="sngStrike" dirty="0"/>
-              <a:t>Data Description</a:t>
+              <a:rPr lang="en-US" sz="3200" dirty="0"/>
+              <a:t>Results</a:t>
             </a:r>
           </a:p>
           <a:p>
             <a:pPr marL="342900" indent="-342900">
+              <a:lnSpc>
+                <a:spcPct val="150000"/>
+              </a:lnSpc>
               <a:buAutoNum type="arabicPeriod"/>
             </a:pPr>
             <a:r>
-              <a:rPr lang="en-US" sz="3200" strike="sngStrike" dirty="0"/>
-              <a:t>Results</a:t>
+              <a:rPr lang="en-US" sz="3200" dirty="0"/>
+              <a:t>Conclusions</a:t>
             </a:r>
           </a:p>
           <a:p>
             <a:pPr marL="342900" indent="-342900">
+              <a:lnSpc>
+                <a:spcPct val="150000"/>
+              </a:lnSpc>
               <a:buAutoNum type="arabicPeriod"/>
             </a:pPr>
             <a:r>
-              <a:rPr lang="en-US" sz="3200" strike="sngStrike" dirty="0"/>
-              <a:t>Conclusions</a:t>
-            </a:r>
-          </a:p>
-          <a:p>
-            <a:pPr marL="342900" indent="-342900">
-              <a:buAutoNum type="arabicPeriod"/>
-            </a:pPr>
-            <a:r>
-              <a:rPr lang="en-US" sz="3200" dirty="0">
-                <a:solidFill>
-                  <a:srgbClr val="FF0000"/>
-                </a:solidFill>
-              </a:rPr>
+              <a:rPr lang="en-US" sz="3200" dirty="0"/>
               <a:t>Future Work/Assignments</a:t>
             </a:r>
           </a:p>
@@ -5667,7 +6334,7 @@
     </p:spTree>
     <p:extLst>
       <p:ext uri="{BB962C8B-B14F-4D97-AF65-F5344CB8AC3E}">
-        <p14:creationId xmlns:p14="http://schemas.microsoft.com/office/powerpoint/2010/main" val="2904275511"/>
+        <p14:creationId xmlns:p14="http://schemas.microsoft.com/office/powerpoint/2010/main" val="2264643325"/>
       </p:ext>
     </p:extLst>
   </p:cSld>
@@ -5677,9 +6344,19 @@
 </p:sld>
 </file>
 
-<file path=ppt/slides/slide24.xml><?xml version="1.0" encoding="utf-8"?>
-<p:sld xmlns:a="http://schemas.openxmlformats.org/drawingml/2006/main" xmlns:r="http://schemas.openxmlformats.org/officeDocument/2006/relationships" xmlns:p="http://schemas.openxmlformats.org/presentationml/2006/main">
+<file path=ppt/slides/slide6.xml><?xml version="1.0" encoding="utf-8"?>
+<p:sld xmlns:a="http://schemas.openxmlformats.org/drawingml/2006/main" xmlns:r="http://schemas.openxmlformats.org/officeDocument/2006/relationships" xmlns:p="http://schemas.openxmlformats.org/presentationml/2006/main" showMasterSp="0">
   <p:cSld>
+    <p:bg>
+      <p:bgPr>
+        <a:solidFill>
+          <a:schemeClr val="bg2">
+            <a:alpha val="0"/>
+          </a:schemeClr>
+        </a:solidFill>
+        <a:effectLst/>
+      </p:bgPr>
+    </p:bg>
     <p:spTree>
       <p:nvGrpSpPr>
         <p:cNvPr id="1" name=""/>
@@ -5699,271 +6376,6 @@
           <p:cNvPr id="2" name="Title 1">
             <a:extLst>
               <a:ext uri="{FF2B5EF4-FFF2-40B4-BE49-F238E27FC236}">
-                <a16:creationId xmlns:a16="http://schemas.microsoft.com/office/drawing/2014/main" id="{3BE2B5BE-8818-1D40-AA3D-4804BA126112}"/>
-              </a:ext>
-            </a:extLst>
-          </p:cNvPr>
-          <p:cNvSpPr>
-            <a:spLocks noGrp="1"/>
-          </p:cNvSpPr>
-          <p:nvPr>
-            <p:ph type="title"/>
-          </p:nvPr>
-        </p:nvSpPr>
-        <p:spPr/>
-        <p:txBody>
-          <a:bodyPr/>
-          <a:lstStyle/>
-          <a:p>
-            <a:r>
-              <a:rPr lang="en-US" dirty="0"/>
-              <a:t>References</a:t>
-            </a:r>
-          </a:p>
-        </p:txBody>
-      </p:sp>
-      <p:sp>
-        <p:nvSpPr>
-          <p:cNvPr id="3" name="Content Placeholder 2">
-            <a:extLst>
-              <a:ext uri="{FF2B5EF4-FFF2-40B4-BE49-F238E27FC236}">
-                <a16:creationId xmlns:a16="http://schemas.microsoft.com/office/drawing/2014/main" id="{9EBE3755-FC78-F441-92C0-9F6CC669855A}"/>
-              </a:ext>
-            </a:extLst>
-          </p:cNvPr>
-          <p:cNvSpPr>
-            <a:spLocks noGrp="1"/>
-          </p:cNvSpPr>
-          <p:nvPr>
-            <p:ph idx="1"/>
-          </p:nvPr>
-        </p:nvSpPr>
-        <p:spPr>
-          <a:xfrm>
-            <a:off x="2231136" y="2153412"/>
-            <a:ext cx="7729728" cy="3586615"/>
-          </a:xfrm>
-        </p:spPr>
-        <p:txBody>
-          <a:bodyPr/>
-          <a:lstStyle/>
-          <a:p>
-            <a:r>
-              <a:rPr lang="en-US" dirty="0"/>
-              <a:t>1. https://</a:t>
-            </a:r>
-            <a:r>
-              <a:rPr lang="en-US" dirty="0" err="1"/>
-              <a:t>blog.dominodatalab.com</a:t>
-            </a:r>
-            <a:r>
-              <a:rPr lang="en-US" dirty="0"/>
-              <a:t>/creating-interactive-crime-maps-with-folium/</a:t>
-            </a:r>
-          </a:p>
-        </p:txBody>
-      </p:sp>
-    </p:spTree>
-    <p:extLst>
-      <p:ext uri="{BB962C8B-B14F-4D97-AF65-F5344CB8AC3E}">
-        <p14:creationId xmlns:p14="http://schemas.microsoft.com/office/powerpoint/2010/main" val="1846751660"/>
-      </p:ext>
-    </p:extLst>
-  </p:cSld>
-  <p:clrMapOvr>
-    <a:masterClrMapping/>
-  </p:clrMapOvr>
-</p:sld>
-</file>
-
-<file path=ppt/slides/slide3.xml><?xml version="1.0" encoding="utf-8"?>
-<p:sld xmlns:a="http://schemas.openxmlformats.org/drawingml/2006/main" xmlns:r="http://schemas.openxmlformats.org/officeDocument/2006/relationships" xmlns:p="http://schemas.openxmlformats.org/presentationml/2006/main">
-  <p:cSld>
-    <p:spTree>
-      <p:nvGrpSpPr>
-        <p:cNvPr id="1" name=""/>
-        <p:cNvGrpSpPr/>
-        <p:nvPr/>
-      </p:nvGrpSpPr>
-      <p:grpSpPr>
-        <a:xfrm>
-          <a:off x="0" y="0"/>
-          <a:ext cx="0" cy="0"/>
-          <a:chOff x="0" y="0"/>
-          <a:chExt cx="0" cy="0"/>
-        </a:xfrm>
-      </p:grpSpPr>
-      <p:sp>
-        <p:nvSpPr>
-          <p:cNvPr id="2" name="Title 1">
-            <a:extLst>
-              <a:ext uri="{FF2B5EF4-FFF2-40B4-BE49-F238E27FC236}">
-                <a16:creationId xmlns:a16="http://schemas.microsoft.com/office/drawing/2014/main" id="{6A74D095-0384-4E74-A61F-43B44B852868}"/>
-              </a:ext>
-            </a:extLst>
-          </p:cNvPr>
-          <p:cNvSpPr>
-            <a:spLocks noGrp="1"/>
-          </p:cNvSpPr>
-          <p:nvPr>
-            <p:ph type="title"/>
-          </p:nvPr>
-        </p:nvSpPr>
-        <p:spPr>
-          <a:xfrm>
-            <a:off x="2066298" y="482779"/>
-            <a:ext cx="7729728" cy="930385"/>
-          </a:xfrm>
-        </p:spPr>
-        <p:txBody>
-          <a:bodyPr>
-            <a:normAutofit/>
-          </a:bodyPr>
-          <a:lstStyle/>
-          <a:p>
-            <a:r>
-              <a:rPr lang="en-US" sz="4000" dirty="0"/>
-              <a:t>Flow of presentation</a:t>
-            </a:r>
-          </a:p>
-        </p:txBody>
-      </p:sp>
-      <p:sp>
-        <p:nvSpPr>
-          <p:cNvPr id="6" name="TextBox 5">
-            <a:extLst>
-              <a:ext uri="{FF2B5EF4-FFF2-40B4-BE49-F238E27FC236}">
-                <a16:creationId xmlns:a16="http://schemas.microsoft.com/office/drawing/2014/main" id="{AD9DB1C8-1735-7749-A35C-AF4B22EC4708}"/>
-              </a:ext>
-            </a:extLst>
-          </p:cNvPr>
-          <p:cNvSpPr txBox="1"/>
-          <p:nvPr/>
-        </p:nvSpPr>
-        <p:spPr>
-          <a:xfrm>
-            <a:off x="1220191" y="1883572"/>
-            <a:ext cx="9594937" cy="4031873"/>
-          </a:xfrm>
-          <a:prstGeom prst="rect">
-            <a:avLst/>
-          </a:prstGeom>
-          <a:noFill/>
-        </p:spPr>
-        <p:txBody>
-          <a:bodyPr wrap="square" rtlCol="0">
-            <a:spAutoFit/>
-          </a:bodyPr>
-          <a:lstStyle/>
-          <a:p>
-            <a:pPr marL="342900" indent="-342900">
-              <a:buAutoNum type="arabicPeriod"/>
-            </a:pPr>
-            <a:r>
-              <a:rPr lang="en-US" sz="3200" dirty="0"/>
-              <a:t>Questions</a:t>
-            </a:r>
-          </a:p>
-          <a:p>
-            <a:pPr marL="342900" indent="-342900">
-              <a:buAutoNum type="arabicPeriod"/>
-            </a:pPr>
-            <a:r>
-              <a:rPr lang="en-US" sz="3200" dirty="0"/>
-              <a:t>Data Sources</a:t>
-            </a:r>
-          </a:p>
-          <a:p>
-            <a:pPr marL="342900" indent="-342900">
-              <a:buAutoNum type="arabicPeriod"/>
-            </a:pPr>
-            <a:r>
-              <a:rPr lang="en-US" sz="3200" dirty="0"/>
-              <a:t>Data Cleaning &amp; Technical Applications</a:t>
-            </a:r>
-          </a:p>
-          <a:p>
-            <a:pPr marL="342900" indent="-342900">
-              <a:buAutoNum type="arabicPeriod"/>
-            </a:pPr>
-            <a:r>
-              <a:rPr lang="en-US" sz="3200" dirty="0"/>
-              <a:t>Data Description</a:t>
-            </a:r>
-          </a:p>
-          <a:p>
-            <a:pPr marL="342900" indent="-342900">
-              <a:buAutoNum type="arabicPeriod"/>
-            </a:pPr>
-            <a:r>
-              <a:rPr lang="en-US" sz="3200" dirty="0"/>
-              <a:t>Results</a:t>
-            </a:r>
-          </a:p>
-          <a:p>
-            <a:pPr marL="342900" indent="-342900">
-              <a:buAutoNum type="arabicPeriod"/>
-            </a:pPr>
-            <a:r>
-              <a:rPr lang="en-US" sz="3200" dirty="0"/>
-              <a:t>Conclusions</a:t>
-            </a:r>
-          </a:p>
-          <a:p>
-            <a:pPr marL="342900" indent="-342900">
-              <a:buAutoNum type="arabicPeriod"/>
-            </a:pPr>
-            <a:r>
-              <a:rPr lang="en-US" sz="3200" dirty="0"/>
-              <a:t>Future Work/Assignments</a:t>
-            </a:r>
-          </a:p>
-          <a:p>
-            <a:pPr marL="342900" indent="-342900">
-              <a:buAutoNum type="arabicPeriod"/>
-            </a:pPr>
-            <a:r>
-              <a:rPr lang="en-US" sz="3200" dirty="0"/>
-              <a:t>References(?)</a:t>
-            </a:r>
-          </a:p>
-        </p:txBody>
-      </p:sp>
-    </p:spTree>
-    <p:extLst>
-      <p:ext uri="{BB962C8B-B14F-4D97-AF65-F5344CB8AC3E}">
-        <p14:creationId xmlns:p14="http://schemas.microsoft.com/office/powerpoint/2010/main" val="713363734"/>
-      </p:ext>
-    </p:extLst>
-  </p:cSld>
-  <p:clrMapOvr>
-    <a:masterClrMapping/>
-  </p:clrMapOvr>
-</p:sld>
-</file>
-
-<file path=ppt/slides/slide4.xml><?xml version="1.0" encoding="utf-8"?>
-<p:sld xmlns:a="http://schemas.openxmlformats.org/drawingml/2006/main" xmlns:r="http://schemas.openxmlformats.org/officeDocument/2006/relationships" xmlns:p="http://schemas.openxmlformats.org/presentationml/2006/main">
-  <p:cSld>
-    <p:spTree>
-      <p:nvGrpSpPr>
-        <p:cNvPr id="1" name=""/>
-        <p:cNvGrpSpPr/>
-        <p:nvPr/>
-      </p:nvGrpSpPr>
-      <p:grpSpPr>
-        <a:xfrm>
-          <a:off x="0" y="0"/>
-          <a:ext cx="0" cy="0"/>
-          <a:chOff x="0" y="0"/>
-          <a:chExt cx="0" cy="0"/>
-        </a:xfrm>
-      </p:grpSpPr>
-      <p:sp>
-        <p:nvSpPr>
-          <p:cNvPr id="2" name="Title 1">
-            <a:extLst>
-              <a:ext uri="{FF2B5EF4-FFF2-40B4-BE49-F238E27FC236}">
                 <a16:creationId xmlns:a16="http://schemas.microsoft.com/office/drawing/2014/main" id="{76A47BE7-C968-4C6E-B64E-28E7C87E7F1B}"/>
               </a:ext>
             </a:extLst>
@@ -5977,17 +6389,19 @@
         </p:nvSpPr>
         <p:spPr>
           <a:xfrm>
-            <a:off x="2218257" y="301877"/>
-            <a:ext cx="7729728" cy="1188720"/>
-          </a:xfrm>
-        </p:spPr>
-        <p:txBody>
-          <a:bodyPr/>
+            <a:off x="3959757" y="467803"/>
+            <a:ext cx="4042611" cy="684712"/>
+          </a:xfrm>
+        </p:spPr>
+        <p:txBody>
+          <a:bodyPr>
+            <a:noAutofit/>
+          </a:bodyPr>
           <a:lstStyle/>
           <a:p>
             <a:r>
               <a:rPr lang="en-US" dirty="0"/>
-              <a:t>1. Questions</a:t>
+              <a:t>Data Sources</a:t>
             </a:r>
           </a:p>
         </p:txBody>
@@ -6010,262 +6424,8 @@
         </p:nvSpPr>
         <p:spPr>
           <a:xfrm>
-            <a:off x="1236930" y="1709538"/>
-            <a:ext cx="8915400" cy="4420625"/>
-          </a:xfrm>
-        </p:spPr>
-        <p:txBody>
-          <a:bodyPr/>
-          <a:lstStyle/>
-          <a:p>
-            <a:endParaRPr lang="en-US" dirty="0"/>
-          </a:p>
-        </p:txBody>
-      </p:sp>
-    </p:spTree>
-    <p:extLst>
-      <p:ext uri="{BB962C8B-B14F-4D97-AF65-F5344CB8AC3E}">
-        <p14:creationId xmlns:p14="http://schemas.microsoft.com/office/powerpoint/2010/main" val="2096109920"/>
-      </p:ext>
-    </p:extLst>
-  </p:cSld>
-  <p:clrMapOvr>
-    <a:masterClrMapping/>
-  </p:clrMapOvr>
-</p:sld>
-</file>
-
-<file path=ppt/slides/slide5.xml><?xml version="1.0" encoding="utf-8"?>
-<p:sld xmlns:a="http://schemas.openxmlformats.org/drawingml/2006/main" xmlns:r="http://schemas.openxmlformats.org/officeDocument/2006/relationships" xmlns:p="http://schemas.openxmlformats.org/presentationml/2006/main">
-  <p:cSld>
-    <p:spTree>
-      <p:nvGrpSpPr>
-        <p:cNvPr id="1" name=""/>
-        <p:cNvGrpSpPr/>
-        <p:nvPr/>
-      </p:nvGrpSpPr>
-      <p:grpSpPr>
-        <a:xfrm>
-          <a:off x="0" y="0"/>
-          <a:ext cx="0" cy="0"/>
-          <a:chOff x="0" y="0"/>
-          <a:chExt cx="0" cy="0"/>
-        </a:xfrm>
-      </p:grpSpPr>
-      <p:sp>
-        <p:nvSpPr>
-          <p:cNvPr id="2" name="Title 1">
-            <a:extLst>
-              <a:ext uri="{FF2B5EF4-FFF2-40B4-BE49-F238E27FC236}">
-                <a16:creationId xmlns:a16="http://schemas.microsoft.com/office/drawing/2014/main" id="{6A74D095-0384-4E74-A61F-43B44B852868}"/>
-              </a:ext>
-            </a:extLst>
-          </p:cNvPr>
-          <p:cNvSpPr>
-            <a:spLocks noGrp="1"/>
-          </p:cNvSpPr>
-          <p:nvPr>
-            <p:ph type="title"/>
-          </p:nvPr>
-        </p:nvSpPr>
-        <p:spPr>
-          <a:xfrm>
-            <a:off x="2066298" y="482779"/>
-            <a:ext cx="7729728" cy="1188720"/>
-          </a:xfrm>
-        </p:spPr>
-        <p:txBody>
-          <a:bodyPr>
-            <a:normAutofit/>
-          </a:bodyPr>
-          <a:lstStyle/>
-          <a:p>
-            <a:r>
-              <a:rPr lang="en-US" sz="4000" dirty="0"/>
-              <a:t>Flow of presentation</a:t>
-            </a:r>
-          </a:p>
-        </p:txBody>
-      </p:sp>
-      <p:sp>
-        <p:nvSpPr>
-          <p:cNvPr id="6" name="TextBox 5">
-            <a:extLst>
-              <a:ext uri="{FF2B5EF4-FFF2-40B4-BE49-F238E27FC236}">
-                <a16:creationId xmlns:a16="http://schemas.microsoft.com/office/drawing/2014/main" id="{AD9DB1C8-1735-7749-A35C-AF4B22EC4708}"/>
-              </a:ext>
-            </a:extLst>
-          </p:cNvPr>
-          <p:cNvSpPr txBox="1"/>
-          <p:nvPr/>
-        </p:nvSpPr>
-        <p:spPr>
-          <a:xfrm>
-            <a:off x="1220191" y="1883572"/>
-            <a:ext cx="9594937" cy="3539430"/>
-          </a:xfrm>
-          <a:prstGeom prst="rect">
-            <a:avLst/>
-          </a:prstGeom>
-          <a:noFill/>
-        </p:spPr>
-        <p:txBody>
-          <a:bodyPr wrap="square" rtlCol="0">
-            <a:spAutoFit/>
-          </a:bodyPr>
-          <a:lstStyle/>
-          <a:p>
-            <a:pPr marL="342900" indent="-342900">
-              <a:buAutoNum type="arabicPeriod"/>
-            </a:pPr>
-            <a:r>
-              <a:rPr lang="en-US" sz="3200" strike="sngStrike" dirty="0"/>
-              <a:t>Questions</a:t>
-            </a:r>
-          </a:p>
-          <a:p>
-            <a:pPr marL="342900" indent="-342900">
-              <a:buAutoNum type="arabicPeriod"/>
-            </a:pPr>
-            <a:r>
-              <a:rPr lang="en-US" sz="3200" dirty="0">
-                <a:solidFill>
-                  <a:srgbClr val="FF0000"/>
-                </a:solidFill>
-              </a:rPr>
-              <a:t>Data Sources</a:t>
-            </a:r>
-          </a:p>
-          <a:p>
-            <a:pPr marL="342900" indent="-342900">
-              <a:buAutoNum type="arabicPeriod"/>
-            </a:pPr>
-            <a:r>
-              <a:rPr lang="en-US" sz="3200" dirty="0"/>
-              <a:t>Data Cleaning &amp; Technical applications</a:t>
-            </a:r>
-          </a:p>
-          <a:p>
-            <a:pPr marL="342900" indent="-342900">
-              <a:buAutoNum type="arabicPeriod"/>
-            </a:pPr>
-            <a:r>
-              <a:rPr lang="en-US" sz="3200" dirty="0"/>
-              <a:t>Data Description</a:t>
-            </a:r>
-          </a:p>
-          <a:p>
-            <a:pPr marL="342900" indent="-342900">
-              <a:buAutoNum type="arabicPeriod"/>
-            </a:pPr>
-            <a:r>
-              <a:rPr lang="en-US" sz="3200" dirty="0"/>
-              <a:t>Results</a:t>
-            </a:r>
-          </a:p>
-          <a:p>
-            <a:pPr marL="342900" indent="-342900">
-              <a:buAutoNum type="arabicPeriod"/>
-            </a:pPr>
-            <a:r>
-              <a:rPr lang="en-US" sz="3200" dirty="0"/>
-              <a:t>Conclusions</a:t>
-            </a:r>
-          </a:p>
-          <a:p>
-            <a:pPr marL="342900" indent="-342900">
-              <a:buAutoNum type="arabicPeriod"/>
-            </a:pPr>
-            <a:r>
-              <a:rPr lang="en-US" sz="3200" dirty="0"/>
-              <a:t>Future Work/Assignments</a:t>
-            </a:r>
-          </a:p>
-        </p:txBody>
-      </p:sp>
-    </p:spTree>
-    <p:extLst>
-      <p:ext uri="{BB962C8B-B14F-4D97-AF65-F5344CB8AC3E}">
-        <p14:creationId xmlns:p14="http://schemas.microsoft.com/office/powerpoint/2010/main" val="2264643325"/>
-      </p:ext>
-    </p:extLst>
-  </p:cSld>
-  <p:clrMapOvr>
-    <a:masterClrMapping/>
-  </p:clrMapOvr>
-</p:sld>
-</file>
-
-<file path=ppt/slides/slide6.xml><?xml version="1.0" encoding="utf-8"?>
-<p:sld xmlns:a="http://schemas.openxmlformats.org/drawingml/2006/main" xmlns:r="http://schemas.openxmlformats.org/officeDocument/2006/relationships" xmlns:p="http://schemas.openxmlformats.org/presentationml/2006/main">
-  <p:cSld>
-    <p:spTree>
-      <p:nvGrpSpPr>
-        <p:cNvPr id="1" name=""/>
-        <p:cNvGrpSpPr/>
-        <p:nvPr/>
-      </p:nvGrpSpPr>
-      <p:grpSpPr>
-        <a:xfrm>
-          <a:off x="0" y="0"/>
-          <a:ext cx="0" cy="0"/>
-          <a:chOff x="0" y="0"/>
-          <a:chExt cx="0" cy="0"/>
-        </a:xfrm>
-      </p:grpSpPr>
-      <p:sp>
-        <p:nvSpPr>
-          <p:cNvPr id="2" name="Title 1">
-            <a:extLst>
-              <a:ext uri="{FF2B5EF4-FFF2-40B4-BE49-F238E27FC236}">
-                <a16:creationId xmlns:a16="http://schemas.microsoft.com/office/drawing/2014/main" id="{76A47BE7-C968-4C6E-B64E-28E7C87E7F1B}"/>
-              </a:ext>
-            </a:extLst>
-          </p:cNvPr>
-          <p:cNvSpPr>
-            <a:spLocks noGrp="1"/>
-          </p:cNvSpPr>
-          <p:nvPr>
-            <p:ph type="title"/>
-          </p:nvPr>
-        </p:nvSpPr>
-        <p:spPr>
-          <a:xfrm>
-            <a:off x="2295530" y="301877"/>
-            <a:ext cx="7729728" cy="1188720"/>
-          </a:xfrm>
-        </p:spPr>
-        <p:txBody>
-          <a:bodyPr/>
-          <a:lstStyle/>
-          <a:p>
-            <a:r>
-              <a:rPr lang="en-US" dirty="0"/>
-              <a:t>2. Data Sources</a:t>
-            </a:r>
-          </a:p>
-        </p:txBody>
-      </p:sp>
-      <p:sp>
-        <p:nvSpPr>
-          <p:cNvPr id="3" name="Content Placeholder 2">
-            <a:extLst>
-              <a:ext uri="{FF2B5EF4-FFF2-40B4-BE49-F238E27FC236}">
-                <a16:creationId xmlns:a16="http://schemas.microsoft.com/office/drawing/2014/main" id="{68EEF821-166E-43EC-9FC5-16D24568EFAB}"/>
-              </a:ext>
-            </a:extLst>
-          </p:cNvPr>
-          <p:cNvSpPr>
-            <a:spLocks noGrp="1"/>
-          </p:cNvSpPr>
-          <p:nvPr>
-            <p:ph idx="1"/>
-          </p:nvPr>
-        </p:nvSpPr>
-        <p:spPr>
-          <a:xfrm>
-            <a:off x="877330" y="1754660"/>
-            <a:ext cx="10207467" cy="4769708"/>
+            <a:off x="664667" y="1669606"/>
+            <a:ext cx="11020502" cy="3923126"/>
           </a:xfrm>
         </p:spPr>
         <p:txBody>
@@ -6274,89 +6434,56 @@
           </a:bodyPr>
           <a:lstStyle/>
           <a:p>
-            <a:pPr marL="0" indent="0">
-              <a:buNone/>
+            <a:pPr marL="514350" indent="-514350">
+              <a:lnSpc>
+                <a:spcPct val="150000"/>
+              </a:lnSpc>
+              <a:buAutoNum type="arabicPeriod"/>
             </a:pPr>
             <a:r>
-              <a:rPr lang="en-US" sz="2800" dirty="0"/>
-              <a:t>1.  Incidence of Crime Data: Los Angeles Open Data (https://</a:t>
-            </a:r>
-            <a:r>
-              <a:rPr lang="en-US" sz="2800" dirty="0" err="1"/>
-              <a:t>data.Lacity.Org</a:t>
-            </a:r>
-            <a:r>
-              <a:rPr lang="en-US" sz="2800" dirty="0"/>
-              <a:t>/)</a:t>
-            </a:r>
-            <a:endParaRPr lang="en-US" sz="2800" cap="all" dirty="0"/>
-          </a:p>
-          <a:p>
-            <a:pPr marL="0" indent="0">
-              <a:buNone/>
+              <a:rPr lang="en-US" sz="3200" dirty="0"/>
+              <a:t>Incidence of Crime Data: Los Angeles Open Data </a:t>
+            </a:r>
+          </a:p>
+          <a:p>
+            <a:pPr marL="514350" indent="-514350">
+              <a:lnSpc>
+                <a:spcPct val="150000"/>
+              </a:lnSpc>
+              <a:buAutoNum type="arabicPeriod"/>
             </a:pPr>
             <a:r>
-              <a:rPr lang="en-US" sz="2800" dirty="0"/>
-              <a:t>2.  Demographic and Socio-Economic Data: Los Angeles Census Reporter (</a:t>
-            </a:r>
-            <a:r>
-              <a:rPr lang="en-US" sz="2800" dirty="0">
-                <a:hlinkClick r:id="rId2"/>
-              </a:rPr>
-              <a:t>https://censusreporter.org/profiles/16000US0644000-los-angeles-ca/</a:t>
-            </a:r>
-            <a:r>
-              <a:rPr lang="en-US" sz="2800" dirty="0"/>
-              <a:t>)</a:t>
-            </a:r>
-          </a:p>
-          <a:p>
-            <a:pPr marL="0" indent="0">
-              <a:buNone/>
+              <a:rPr lang="en-US" sz="3200" dirty="0"/>
+              <a:t>Demographic and Socio-Economic Data: Los Angeles Census Reporter</a:t>
+            </a:r>
+          </a:p>
+          <a:p>
+            <a:pPr marL="514350" indent="-514350">
+              <a:lnSpc>
+                <a:spcPct val="150000"/>
+              </a:lnSpc>
+              <a:buAutoNum type="arabicPeriod"/>
             </a:pPr>
             <a:r>
-              <a:rPr lang="en-US" sz="2800" dirty="0"/>
-              <a:t>3. Mapping Library: Folium 0.6.0 (</a:t>
-            </a:r>
-            <a:r>
-              <a:rPr lang="en-US" sz="2800" dirty="0">
-                <a:hlinkClick r:id="rId3"/>
-              </a:rPr>
-              <a:t>https://pypi.org/project/folium/</a:t>
-            </a:r>
-            <a:r>
-              <a:rPr lang="en-US" sz="2800" dirty="0"/>
-              <a:t>)(?)</a:t>
-            </a:r>
-          </a:p>
-          <a:p>
-            <a:pPr marL="0" indent="0">
-              <a:buNone/>
+              <a:rPr lang="en-US" sz="3600" dirty="0"/>
+              <a:t>Mapping</a:t>
+            </a:r>
+            <a:r>
+              <a:rPr lang="en-US" sz="3200" dirty="0"/>
+              <a:t> Library: Folium 0.6.0</a:t>
+            </a:r>
+          </a:p>
+          <a:p>
+            <a:pPr marL="514350" indent="-514350">
+              <a:lnSpc>
+                <a:spcPct val="150000"/>
+              </a:lnSpc>
+              <a:buAutoNum type="arabicPeriod"/>
             </a:pPr>
             <a:r>
-              <a:rPr lang="en-US" sz="2800" dirty="0"/>
-              <a:t>4. Boundary Files for Mapping:  L.A. Boundaries API (http://</a:t>
-            </a:r>
-            <a:r>
-              <a:rPr lang="en-US" sz="2800" dirty="0" err="1"/>
-              <a:t>boundaries.latimes.com</a:t>
-            </a:r>
-            <a:r>
-              <a:rPr lang="en-US" sz="2800" dirty="0"/>
-              <a:t>/sets/)(?)</a:t>
-            </a:r>
-          </a:p>
-          <a:p>
-            <a:pPr marL="0" indent="0">
-              <a:buNone/>
-            </a:pPr>
-            <a:endParaRPr lang="en-US" sz="2800" dirty="0"/>
-          </a:p>
-          <a:p>
-            <a:pPr marL="0" indent="0">
-              <a:buNone/>
-            </a:pPr>
-            <a:endParaRPr lang="en-US" sz="2800" dirty="0"/>
+              <a:rPr lang="en-US" sz="3200" dirty="0"/>
+              <a:t>Boundary Files for Mapping:  L.A. Boundaries API</a:t>
+            </a:r>
           </a:p>
         </p:txBody>
       </p:sp>
@@ -6376,6 +6503,16 @@
 <file path=ppt/slides/slide7.xml><?xml version="1.0" encoding="utf-8"?>
 <p:sld xmlns:a="http://schemas.openxmlformats.org/drawingml/2006/main" xmlns:r="http://schemas.openxmlformats.org/officeDocument/2006/relationships" xmlns:p="http://schemas.openxmlformats.org/presentationml/2006/main">
   <p:cSld>
+    <p:bg>
+      <p:bgPr>
+        <a:solidFill>
+          <a:schemeClr val="bg2">
+            <a:alpha val="0"/>
+          </a:schemeClr>
+        </a:solidFill>
+        <a:effectLst/>
+      </p:bgPr>
+    </p:bg>
     <p:spTree>
       <p:nvGrpSpPr>
         <p:cNvPr id="1" name=""/>
@@ -6408,19 +6545,19 @@
         </p:nvSpPr>
         <p:spPr>
           <a:xfrm>
-            <a:off x="2066298" y="482779"/>
-            <a:ext cx="7729728" cy="1188720"/>
+            <a:off x="2449136" y="619049"/>
+            <a:ext cx="7353614" cy="563968"/>
           </a:xfrm>
         </p:spPr>
         <p:txBody>
           <a:bodyPr>
-            <a:normAutofit/>
+            <a:normAutofit fontScale="90000"/>
           </a:bodyPr>
           <a:lstStyle/>
           <a:p>
             <a:r>
               <a:rPr lang="en-US" sz="4000" dirty="0"/>
-              <a:t>Flow of presentation</a:t>
+              <a:t>Rest of the presentation</a:t>
             </a:r>
           </a:p>
         </p:txBody>
@@ -6439,8 +6576,8 @@
         </p:nvSpPr>
         <p:spPr>
           <a:xfrm>
-            <a:off x="1220191" y="1883572"/>
-            <a:ext cx="9594937" cy="3539430"/>
+            <a:off x="1339702" y="1637414"/>
+            <a:ext cx="9583710" cy="3698833"/>
           </a:xfrm>
           <a:prstGeom prst="rect">
             <a:avLst/>
@@ -6453,26 +6590,12 @@
           </a:bodyPr>
           <a:lstStyle/>
           <a:p>
-            <a:pPr marL="342900" indent="-342900">
-              <a:buAutoNum type="arabicPeriod"/>
-            </a:pPr>
-            <a:r>
-              <a:rPr lang="en-US" sz="3200" strike="sngStrike" dirty="0"/>
-              <a:t>Questions</a:t>
-            </a:r>
-          </a:p>
-          <a:p>
-            <a:pPr marL="342900" indent="-342900">
-              <a:buAutoNum type="arabicPeriod"/>
-            </a:pPr>
-            <a:r>
-              <a:rPr lang="en-US" sz="3200" strike="sngStrike" dirty="0"/>
-              <a:t>Data Sources</a:t>
-            </a:r>
-          </a:p>
-          <a:p>
-            <a:pPr marL="342900" indent="-342900">
-              <a:buAutoNum type="arabicPeriod"/>
+            <a:pPr marL="457200" indent="-457200">
+              <a:lnSpc>
+                <a:spcPct val="150000"/>
+              </a:lnSpc>
+              <a:buFont typeface="Arial" panose="020B0604020202020204" pitchFamily="34" charset="0"/>
+              <a:buChar char="•"/>
             </a:pPr>
             <a:r>
               <a:rPr lang="en-US" sz="3200" dirty="0">
@@ -6484,8 +6607,12 @@
             </a:r>
           </a:p>
           <a:p>
-            <a:pPr marL="342900" indent="-342900">
-              <a:buAutoNum type="arabicPeriod"/>
+            <a:pPr marL="457200" indent="-457200">
+              <a:lnSpc>
+                <a:spcPct val="150000"/>
+              </a:lnSpc>
+              <a:buFont typeface="Arial" panose="020B0604020202020204" pitchFamily="34" charset="0"/>
+              <a:buChar char="•"/>
             </a:pPr>
             <a:r>
               <a:rPr lang="en-US" sz="3200" dirty="0"/>
@@ -6493,8 +6620,12 @@
             </a:r>
           </a:p>
           <a:p>
-            <a:pPr marL="342900" indent="-342900">
-              <a:buAutoNum type="arabicPeriod"/>
+            <a:pPr marL="457200" indent="-457200">
+              <a:lnSpc>
+                <a:spcPct val="150000"/>
+              </a:lnSpc>
+              <a:buFont typeface="Arial" panose="020B0604020202020204" pitchFamily="34" charset="0"/>
+              <a:buChar char="•"/>
             </a:pPr>
             <a:r>
               <a:rPr lang="en-US" sz="3200" dirty="0"/>
@@ -6502,8 +6633,12 @@
             </a:r>
           </a:p>
           <a:p>
-            <a:pPr marL="342900" indent="-342900">
-              <a:buAutoNum type="arabicPeriod"/>
+            <a:pPr marL="457200" indent="-457200">
+              <a:lnSpc>
+                <a:spcPct val="150000"/>
+              </a:lnSpc>
+              <a:buFont typeface="Arial" panose="020B0604020202020204" pitchFamily="34" charset="0"/>
+              <a:buChar char="•"/>
             </a:pPr>
             <a:r>
               <a:rPr lang="en-US" sz="3200" dirty="0"/>
@@ -6511,8 +6646,12 @@
             </a:r>
           </a:p>
           <a:p>
-            <a:pPr marL="342900" indent="-342900">
-              <a:buAutoNum type="arabicPeriod"/>
+            <a:pPr marL="457200" indent="-457200">
+              <a:lnSpc>
+                <a:spcPct val="150000"/>
+              </a:lnSpc>
+              <a:buFont typeface="Arial" panose="020B0604020202020204" pitchFamily="34" charset="0"/>
+              <a:buChar char="•"/>
             </a:pPr>
             <a:r>
               <a:rPr lang="en-US" sz="3200" dirty="0"/>
@@ -6524,7 +6663,7 @@
     </p:spTree>
     <p:extLst>
       <p:ext uri="{BB962C8B-B14F-4D97-AF65-F5344CB8AC3E}">
-        <p14:creationId xmlns:p14="http://schemas.microsoft.com/office/powerpoint/2010/main" val="576126389"/>
+        <p14:creationId xmlns:p14="http://schemas.microsoft.com/office/powerpoint/2010/main" val="1205038651"/>
       </p:ext>
     </p:extLst>
   </p:cSld>
@@ -6535,8 +6674,18 @@
 </file>
 
 <file path=ppt/slides/slide8.xml><?xml version="1.0" encoding="utf-8"?>
-<p:sld xmlns:a="http://schemas.openxmlformats.org/drawingml/2006/main" xmlns:r="http://schemas.openxmlformats.org/officeDocument/2006/relationships" xmlns:p="http://schemas.openxmlformats.org/presentationml/2006/main">
+<p:sld xmlns:a="http://schemas.openxmlformats.org/drawingml/2006/main" xmlns:r="http://schemas.openxmlformats.org/officeDocument/2006/relationships" xmlns:p="http://schemas.openxmlformats.org/presentationml/2006/main" showMasterSp="0">
   <p:cSld>
+    <p:bg>
+      <p:bgPr>
+        <a:solidFill>
+          <a:schemeClr val="bg2">
+            <a:alpha val="0"/>
+          </a:schemeClr>
+        </a:solidFill>
+        <a:effectLst/>
+      </p:bgPr>
+    </p:bg>
     <p:spTree>
       <p:nvGrpSpPr>
         <p:cNvPr id="1" name=""/>
@@ -6606,6 +6755,16 @@
 <file path=ppt/slides/slide9.xml><?xml version="1.0" encoding="utf-8"?>
 <p:sld xmlns:a="http://schemas.openxmlformats.org/drawingml/2006/main" xmlns:r="http://schemas.openxmlformats.org/officeDocument/2006/relationships" xmlns:p="http://schemas.openxmlformats.org/presentationml/2006/main">
   <p:cSld>
+    <p:bg>
+      <p:bgPr>
+        <a:solidFill>
+          <a:schemeClr val="bg2">
+            <a:alpha val="1000"/>
+          </a:schemeClr>
+        </a:solidFill>
+        <a:effectLst/>
+      </p:bgPr>
+    </p:bg>
     <p:spTree>
       <p:nvGrpSpPr>
         <p:cNvPr id="1" name=""/>
@@ -6638,19 +6797,19 @@
         </p:nvSpPr>
         <p:spPr>
           <a:xfrm>
-            <a:off x="2066298" y="482779"/>
-            <a:ext cx="7729728" cy="1188720"/>
+            <a:off x="2449136" y="619049"/>
+            <a:ext cx="7353614" cy="563968"/>
           </a:xfrm>
         </p:spPr>
         <p:txBody>
           <a:bodyPr>
-            <a:normAutofit/>
+            <a:normAutofit fontScale="90000"/>
           </a:bodyPr>
           <a:lstStyle/>
           <a:p>
             <a:r>
               <a:rPr lang="en-US" sz="4000" dirty="0"/>
-              <a:t>Flow of presentation</a:t>
+              <a:t>Rest of the presentation</a:t>
             </a:r>
           </a:p>
         </p:txBody>
@@ -6669,8 +6828,8 @@
         </p:nvSpPr>
         <p:spPr>
           <a:xfrm>
-            <a:off x="1220191" y="1821788"/>
-            <a:ext cx="9594937" cy="3539430"/>
+            <a:off x="1297172" y="1637414"/>
+            <a:ext cx="9626240" cy="3318665"/>
           </a:xfrm>
           <a:prstGeom prst="rect">
             <a:avLst/>
@@ -6683,38 +6842,15 @@
           </a:bodyPr>
           <a:lstStyle/>
           <a:p>
-            <a:pPr marL="342900" indent="-342900">
-              <a:buAutoNum type="arabicPeriod"/>
+            <a:pPr marL="571500" indent="-571500">
+              <a:lnSpc>
+                <a:spcPct val="150000"/>
+              </a:lnSpc>
+              <a:buFont typeface="Arial" panose="020B0604020202020204" pitchFamily="34" charset="0"/>
+              <a:buChar char="•"/>
             </a:pPr>
             <a:r>
-              <a:rPr lang="en-US" sz="3200" strike="sngStrike" dirty="0"/>
-              <a:t>Questions</a:t>
-            </a:r>
-          </a:p>
-          <a:p>
-            <a:pPr marL="342900" indent="-342900">
-              <a:buAutoNum type="arabicPeriod"/>
-            </a:pPr>
-            <a:r>
-              <a:rPr lang="en-US" sz="3200" strike="sngStrike" dirty="0"/>
-              <a:t>Data Sources</a:t>
-            </a:r>
-          </a:p>
-          <a:p>
-            <a:pPr marL="342900" indent="-342900">
-              <a:buAutoNum type="arabicPeriod"/>
-            </a:pPr>
-            <a:r>
-              <a:rPr lang="en-US" sz="3200" strike="sngStrike" dirty="0"/>
-              <a:t>Data Cleaning &amp; Technical Applications</a:t>
-            </a:r>
-          </a:p>
-          <a:p>
-            <a:pPr marL="342900" indent="-342900">
-              <a:buAutoNum type="arabicPeriod"/>
-            </a:pPr>
-            <a:r>
-              <a:rPr lang="en-US" sz="3200" dirty="0">
+              <a:rPr lang="en-US" sz="3600" dirty="0">
                 <a:solidFill>
                   <a:srgbClr val="FF0000"/>
                 </a:solidFill>
@@ -6723,29 +6859,41 @@
             </a:r>
           </a:p>
           <a:p>
-            <a:pPr marL="342900" indent="-342900">
-              <a:buAutoNum type="arabicPeriod"/>
+            <a:pPr marL="571500" indent="-571500">
+              <a:lnSpc>
+                <a:spcPct val="150000"/>
+              </a:lnSpc>
+              <a:buFont typeface="Arial" panose="020B0604020202020204" pitchFamily="34" charset="0"/>
+              <a:buChar char="•"/>
             </a:pPr>
             <a:r>
-              <a:rPr lang="en-US" sz="3200" dirty="0"/>
+              <a:rPr lang="en-US" sz="3600" dirty="0"/>
               <a:t>Results</a:t>
             </a:r>
           </a:p>
           <a:p>
-            <a:pPr marL="342900" indent="-342900">
-              <a:buAutoNum type="arabicPeriod"/>
+            <a:pPr marL="571500" indent="-571500">
+              <a:lnSpc>
+                <a:spcPct val="150000"/>
+              </a:lnSpc>
+              <a:buFont typeface="Arial" panose="020B0604020202020204" pitchFamily="34" charset="0"/>
+              <a:buChar char="•"/>
             </a:pPr>
             <a:r>
-              <a:rPr lang="en-US" sz="3200" dirty="0"/>
+              <a:rPr lang="en-US" sz="3600" dirty="0"/>
               <a:t>Conclusions</a:t>
             </a:r>
           </a:p>
           <a:p>
-            <a:pPr marL="342900" indent="-342900">
-              <a:buAutoNum type="arabicPeriod"/>
+            <a:pPr marL="571500" indent="-571500">
+              <a:lnSpc>
+                <a:spcPct val="150000"/>
+              </a:lnSpc>
+              <a:buFont typeface="Arial" panose="020B0604020202020204" pitchFamily="34" charset="0"/>
+              <a:buChar char="•"/>
             </a:pPr>
             <a:r>
-              <a:rPr lang="en-US" sz="3200" dirty="0"/>
+              <a:rPr lang="en-US" sz="3600" dirty="0"/>
               <a:t>Future Work/Assignments</a:t>
             </a:r>
           </a:p>
@@ -6754,7 +6902,7 @@
     </p:spTree>
     <p:extLst>
       <p:ext uri="{BB962C8B-B14F-4D97-AF65-F5344CB8AC3E}">
-        <p14:creationId xmlns:p14="http://schemas.microsoft.com/office/powerpoint/2010/main" val="840932881"/>
+        <p14:creationId xmlns:p14="http://schemas.microsoft.com/office/powerpoint/2010/main" val="1762444825"/>
       </p:ext>
     </p:extLst>
   </p:cSld>
@@ -6772,37 +6920,37 @@
         <a:srgbClr val="000000"/>
       </a:dk1>
       <a:lt1>
-        <a:srgbClr val="FFFFFF"/>
+        <a:sysClr val="window" lastClr="FFFFFF"/>
       </a:lt1>
       <a:dk2>
-        <a:srgbClr val="4A5356"/>
+        <a:srgbClr val="5E5E5E"/>
       </a:dk2>
       <a:lt2>
-        <a:srgbClr val="E8E3CE"/>
+        <a:srgbClr val="DDDDDD"/>
       </a:lt2>
       <a:accent1>
-        <a:srgbClr val="F6A21D"/>
+        <a:srgbClr val="A6B727"/>
       </a:accent1>
       <a:accent2>
-        <a:srgbClr val="9BAFB5"/>
+        <a:srgbClr val="418AB3"/>
       </a:accent2>
       <a:accent3>
-        <a:srgbClr val="C96731"/>
+        <a:srgbClr val="F69200"/>
       </a:accent3>
       <a:accent4>
-        <a:srgbClr val="9CA383"/>
+        <a:srgbClr val="838383"/>
       </a:accent4>
       <a:accent5>
-        <a:srgbClr val="87795D"/>
+        <a:srgbClr val="FEC306"/>
       </a:accent5>
       <a:accent6>
-        <a:srgbClr val="A0988C"/>
+        <a:srgbClr val="DF5327"/>
       </a:accent6>
       <a:hlink>
-        <a:srgbClr val="00B0F0"/>
+        <a:srgbClr val="F59E00"/>
       </a:hlink>
       <a:folHlink>
-        <a:srgbClr val="738F97"/>
+        <a:srgbClr val="B2B2B2"/>
       </a:folHlink>
     </a:clrScheme>
     <a:fontScheme name="Parcel">
@@ -7018,7 +7166,7 @@
   <a:extraClrSchemeLst/>
   <a:extLst>
     <a:ext uri="{05A4C25C-085E-4340-85A3-A5531E510DB2}">
-      <thm15:themeFamily xmlns:thm15="http://schemas.microsoft.com/office/thememl/2012/main" name="Parcel" id="{8BEC4385-4EB9-4D53-BFB5-0EA123736B6D}" vid="{4DB32801-28C0-48B0-8C1D-A9A58613615A}"/>
+      <thm15:themeFamily xmlns:thm15="http://schemas.microsoft.com/office/thememl/2012/main" name="Parcel" id="{8BEC4385-4EB9-4D53-BFB5-0EA123736B6D}" vid="{A425FB89-E954-4A2A-81DC-D90804A94DBA}"/>
     </a:ext>
   </a:extLst>
 </a:theme>

</xml_diff>